<commit_message>
New Model Of Poster almost 100%
</commit_message>
<xml_diff>
--- a/CA3/Poster_CA3_Luis_Martins.pptx
+++ b/CA3/Poster_CA3_Luis_Martins.pptx
@@ -273,7 +273,7 @@
             <a:fld id="{0158C5BC-9A70-462C-B28D-9600239EAC64}" type="datetimeFigureOut">
               <a:rPr lang="en-US" smtClean="0"/>
               <a:pPr/>
-              <a:t>11/12/2025</a:t>
+              <a:t>11/23/2025</a:t>
             </a:fld>
             <a:endParaRPr lang="en-US"/>
           </a:p>
@@ -440,7 +440,7 @@
             <a:fld id="{E6CC2317-6751-4CD4-9995-8782DD78E936}" type="datetimeFigureOut">
               <a:rPr lang="en-US" smtClean="0"/>
               <a:pPr/>
-              <a:t>11/12/2025</a:t>
+              <a:t>11/23/2025</a:t>
             </a:fld>
             <a:endParaRPr lang="en-US" dirty="0"/>
           </a:p>
@@ -1888,7 +1888,7 @@
             <a:fld id="{1D8BD707-D9CF-40AE-B4C6-C98DA3205C09}" type="datetimeFigureOut">
               <a:rPr lang="en-US" smtClean="0"/>
               <a:pPr/>
-              <a:t>11/12/2025</a:t>
+              <a:t>11/23/2025</a:t>
             </a:fld>
             <a:endParaRPr lang="en-US"/>
           </a:p>
@@ -2165,7 +2165,7 @@
             <a:fld id="{1D8BD707-D9CF-40AE-B4C6-C98DA3205C09}" type="datetimeFigureOut">
               <a:rPr lang="en-US" smtClean="0"/>
               <a:pPr/>
-              <a:t>11/12/2025</a:t>
+              <a:t>11/23/2025</a:t>
             </a:fld>
             <a:endParaRPr lang="en-US"/>
           </a:p>
@@ -2419,7 +2419,7 @@
             <a:fld id="{1D8BD707-D9CF-40AE-B4C6-C98DA3205C09}" type="datetimeFigureOut">
               <a:rPr lang="en-US" smtClean="0"/>
               <a:pPr/>
-              <a:t>11/12/2025</a:t>
+              <a:t>11/23/2025</a:t>
             </a:fld>
             <a:endParaRPr lang="en-US"/>
           </a:p>
@@ -2589,7 +2589,7 @@
             <a:fld id="{1D8BD707-D9CF-40AE-B4C6-C98DA3205C09}" type="datetimeFigureOut">
               <a:rPr lang="en-US" smtClean="0"/>
               <a:pPr/>
-              <a:t>11/12/2025</a:t>
+              <a:t>11/23/2025</a:t>
             </a:fld>
             <a:endParaRPr lang="en-US"/>
           </a:p>
@@ -2769,7 +2769,7 @@
             <a:fld id="{1D8BD707-D9CF-40AE-B4C6-C98DA3205C09}" type="datetimeFigureOut">
               <a:rPr lang="en-US" smtClean="0"/>
               <a:pPr/>
-              <a:t>11/12/2025</a:t>
+              <a:t>11/23/2025</a:t>
             </a:fld>
             <a:endParaRPr lang="en-US"/>
           </a:p>
@@ -4958,7 +4958,7 @@
             <a:fld id="{1D8BD707-D9CF-40AE-B4C6-C98DA3205C09}" type="datetimeFigureOut">
               <a:rPr lang="en-US" smtClean="0"/>
               <a:pPr/>
-              <a:t>11/12/2025</a:t>
+              <a:t>11/23/2025</a:t>
             </a:fld>
             <a:endParaRPr lang="en-US"/>
           </a:p>
@@ -5128,7 +5128,7 @@
             <a:fld id="{1D8BD707-D9CF-40AE-B4C6-C98DA3205C09}" type="datetimeFigureOut">
               <a:rPr lang="en-US" smtClean="0"/>
               <a:pPr/>
-              <a:t>11/12/2025</a:t>
+              <a:t>11/23/2025</a:t>
             </a:fld>
             <a:endParaRPr lang="en-US"/>
           </a:p>
@@ -5375,7 +5375,7 @@
             <a:fld id="{1D8BD707-D9CF-40AE-B4C6-C98DA3205C09}" type="datetimeFigureOut">
               <a:rPr lang="en-US" smtClean="0"/>
               <a:pPr/>
-              <a:t>11/12/2025</a:t>
+              <a:t>11/23/2025</a:t>
             </a:fld>
             <a:endParaRPr lang="en-US"/>
           </a:p>
@@ -5662,7 +5662,7 @@
             <a:fld id="{1D8BD707-D9CF-40AE-B4C6-C98DA3205C09}" type="datetimeFigureOut">
               <a:rPr lang="en-US" smtClean="0"/>
               <a:pPr/>
-              <a:t>11/12/2025</a:t>
+              <a:t>11/23/2025</a:t>
             </a:fld>
             <a:endParaRPr lang="en-US"/>
           </a:p>
@@ -6083,7 +6083,7 @@
             <a:fld id="{1D8BD707-D9CF-40AE-B4C6-C98DA3205C09}" type="datetimeFigureOut">
               <a:rPr lang="en-US" smtClean="0"/>
               <a:pPr/>
-              <a:t>11/12/2025</a:t>
+              <a:t>11/23/2025</a:t>
             </a:fld>
             <a:endParaRPr lang="en-US"/>
           </a:p>
@@ -6202,7 +6202,7 @@
             <a:fld id="{1D8BD707-D9CF-40AE-B4C6-C98DA3205C09}" type="datetimeFigureOut">
               <a:rPr lang="en-US" smtClean="0"/>
               <a:pPr/>
-              <a:t>11/12/2025</a:t>
+              <a:t>11/23/2025</a:t>
             </a:fld>
             <a:endParaRPr lang="en-US"/>
           </a:p>
@@ -16819,7 +16819,7 @@
             <a:fld id="{1D8BD707-D9CF-40AE-B4C6-C98DA3205C09}" type="datetimeFigureOut">
               <a:rPr lang="en-US" smtClean="0"/>
               <a:pPr/>
-              <a:t>11/12/2025</a:t>
+              <a:t>11/23/2025</a:t>
             </a:fld>
             <a:endParaRPr lang="en-US"/>
           </a:p>
@@ -17244,36 +17244,6 @@
           </a:p>
         </p:txBody>
       </p:sp>
-      <p:pic>
-        <p:nvPicPr>
-          <p:cNvPr id="12" name="Picture 11">
-            <a:extLst>
-              <a:ext uri="{FF2B5EF4-FFF2-40B4-BE49-F238E27FC236}">
-                <a16:creationId xmlns:a16="http://schemas.microsoft.com/office/drawing/2014/main" id="{748440B3-FEF2-F616-0DDA-1C5388854788}"/>
-              </a:ext>
-            </a:extLst>
-          </p:cNvPr>
-          <p:cNvPicPr>
-            <a:picLocks noChangeAspect="1"/>
-          </p:cNvPicPr>
-          <p:nvPr/>
-        </p:nvPicPr>
-        <p:blipFill>
-          <a:blip r:embed="rId3"/>
-          <a:stretch>
-            <a:fillRect/>
-          </a:stretch>
-        </p:blipFill>
-        <p:spPr>
-          <a:xfrm>
-            <a:off x="22959859" y="12060459"/>
-            <a:ext cx="4485281" cy="2226703"/>
-          </a:xfrm>
-          <a:prstGeom prst="rect">
-            <a:avLst/>
-          </a:prstGeom>
-        </p:spPr>
-      </p:pic>
       <p:sp>
         <p:nvSpPr>
           <p:cNvPr id="22" name="AutoShape 3">
@@ -17338,15 +17308,15 @@
           <p:nvPr/>
         </p:nvPicPr>
         <p:blipFill>
-          <a:blip r:embed="rId4"/>
+          <a:blip r:embed="rId3"/>
           <a:stretch>
             <a:fillRect/>
           </a:stretch>
         </p:blipFill>
         <p:spPr>
           <a:xfrm>
-            <a:off x="15003823" y="7661399"/>
-            <a:ext cx="7601345" cy="4323671"/>
+            <a:off x="15231978" y="4893877"/>
+            <a:ext cx="7180604" cy="4084352"/>
           </a:xfrm>
           <a:prstGeom prst="rect">
             <a:avLst/>
@@ -17361,7 +17331,7 @@
         </p:nvSpPr>
         <p:spPr>
           <a:xfrm>
-            <a:off x="118" y="-1"/>
+            <a:off x="-210965" y="-1"/>
             <a:ext cx="7555471" cy="21383625"/>
           </a:xfrm>
           <a:prstGeom prst="rect">
@@ -17393,8 +17363,8 @@
         </p:nvSpPr>
         <p:spPr>
           <a:xfrm>
-            <a:off x="7555591" y="-1"/>
-            <a:ext cx="7367456" cy="21383625"/>
+            <a:off x="7350681" y="-6110"/>
+            <a:ext cx="7590100" cy="21383625"/>
           </a:xfrm>
           <a:prstGeom prst="rect">
             <a:avLst/>
@@ -17440,8 +17410,8 @@
         </p:nvGrpSpPr>
         <p:grpSpPr>
           <a:xfrm>
-            <a:off x="7774588" y="148344"/>
-            <a:ext cx="6799730" cy="1080000"/>
+            <a:off x="7624918" y="140268"/>
+            <a:ext cx="6663649" cy="916626"/>
             <a:chOff x="8018428" y="912724"/>
             <a:chExt cx="6799730" cy="1080000"/>
           </a:xfrm>
@@ -17698,7 +17668,7 @@
         <p:spPr>
           <a:xfrm>
             <a:off x="22924226" y="15339851"/>
-            <a:ext cx="7021291" cy="3375283"/>
+            <a:ext cx="7021291" cy="4398640"/>
           </a:xfrm>
           <a:prstGeom prst="rect">
             <a:avLst/>
@@ -17722,7 +17692,23 @@
                 </a:solidFill>
                 <a:latin typeface="Arial Nova Light"/>
               </a:rPr>
-              <a:t>Q1: Can intrinsic audio features and metadata predict popularity?</a:t>
+              <a:t>Question 1: </a:t>
+            </a:r>
+          </a:p>
+          <a:p>
+            <a:pPr algn="just">
+              <a:spcAft>
+                <a:spcPts val="800"/>
+              </a:spcAft>
+            </a:pPr>
+            <a:r>
+              <a:rPr lang="en-US" sz="1550" spc="-1" dirty="0">
+                <a:solidFill>
+                  <a:prstClr val="black"/>
+                </a:solidFill>
+                <a:latin typeface="Arial Nova Light"/>
+              </a:rPr>
+              <a:t>Can intrinsic audio features and metadata predict popularity?</a:t>
             </a:r>
           </a:p>
           <a:p>
@@ -17740,7 +17726,25 @@
                 </a:solidFill>
                 <a:latin typeface="Arial Nova Light"/>
               </a:rPr>
-              <a:t>A: Yes. Our model confirms that intrinsic features are strong predictors. </a:t>
+              <a:t>A: </a:t>
+            </a:r>
+            <a:r>
+              <a:rPr lang="en-US" sz="1550" b="1" spc="-1" dirty="0">
+                <a:solidFill>
+                  <a:prstClr val="black"/>
+                </a:solidFill>
+                <a:latin typeface="Arial Nova Light"/>
+              </a:rPr>
+              <a:t>Yes</a:t>
+            </a:r>
+            <a:r>
+              <a:rPr lang="en-US" sz="1550" spc="-1" dirty="0">
+                <a:solidFill>
+                  <a:prstClr val="black"/>
+                </a:solidFill>
+                <a:latin typeface="Arial Nova Light"/>
+              </a:rPr>
+              <a:t>. Our model confirms that intrinsic features are strong predictors. </a:t>
             </a:r>
             <a:r>
               <a:rPr lang="en-US" sz="1550" spc="-1" dirty="0" err="1">
@@ -17828,7 +17832,23 @@
                 </a:solidFill>
                 <a:latin typeface="Arial Nova Light"/>
               </a:rPr>
-              <a:t>Q2: Do structural elements show a significant correlation with popularity?</a:t>
+              <a:t>Question 2: </a:t>
+            </a:r>
+          </a:p>
+          <a:p>
+            <a:pPr algn="just">
+              <a:spcAft>
+                <a:spcPts val="800"/>
+              </a:spcAft>
+            </a:pPr>
+            <a:r>
+              <a:rPr lang="en-US" sz="1550" spc="-1" dirty="0">
+                <a:solidFill>
+                  <a:prstClr val="black"/>
+                </a:solidFill>
+                <a:latin typeface="Arial Nova Light"/>
+              </a:rPr>
+              <a:t>Do structural elements show a significant correlation with popularity?</a:t>
             </a:r>
           </a:p>
           <a:p>
@@ -17846,7 +17866,25 @@
                 </a:solidFill>
                 <a:latin typeface="Arial Nova Light"/>
               </a:rPr>
-              <a:t>A: Yes. Structural elements are key. </a:t>
+              <a:t>A: </a:t>
+            </a:r>
+            <a:r>
+              <a:rPr lang="en-US" sz="1550" b="1" spc="-1" dirty="0">
+                <a:solidFill>
+                  <a:prstClr val="black"/>
+                </a:solidFill>
+                <a:latin typeface="Arial Nova Light"/>
+              </a:rPr>
+              <a:t>Yes</a:t>
+            </a:r>
+            <a:r>
+              <a:rPr lang="en-US" sz="1550" spc="-1" dirty="0">
+                <a:solidFill>
+                  <a:prstClr val="black"/>
+                </a:solidFill>
+                <a:latin typeface="Arial Nova Light"/>
+              </a:rPr>
+              <a:t>. Structural elements are key. </a:t>
             </a:r>
             <a:r>
               <a:rPr lang="en-US" sz="1550" spc="-1" dirty="0" err="1">
@@ -17880,7 +17918,23 @@
                 </a:solidFill>
                 <a:latin typeface="Arial Nova Light"/>
               </a:rPr>
-              <a:t>Q3: Can a machine learning model accurately predict high popularity?</a:t>
+              <a:t>Question 3: </a:t>
+            </a:r>
+          </a:p>
+          <a:p>
+            <a:pPr algn="just">
+              <a:spcAft>
+                <a:spcPts val="800"/>
+              </a:spcAft>
+            </a:pPr>
+            <a:r>
+              <a:rPr lang="en-US" sz="1550" spc="-1" dirty="0">
+                <a:solidFill>
+                  <a:prstClr val="black"/>
+                </a:solidFill>
+                <a:latin typeface="Arial Nova Light"/>
+              </a:rPr>
+              <a:t>Can a machine learning model accurately predict high popularity?</a:t>
             </a:r>
           </a:p>
           <a:p>
@@ -17898,7 +17952,25 @@
                 </a:solidFill>
                 <a:latin typeface="Arial Nova Light"/>
               </a:rPr>
-              <a:t>A: Yes. We successfully developed a Random Forest Classifier that achieved 89.75% accuracy at predicting whether a song would be "Popular" (1) or "Not Popular" (0).</a:t>
+              <a:t>A: </a:t>
+            </a:r>
+            <a:r>
+              <a:rPr lang="en-US" sz="1550" b="1" spc="-1" dirty="0">
+                <a:solidFill>
+                  <a:prstClr val="black"/>
+                </a:solidFill>
+                <a:latin typeface="Arial Nova Light"/>
+              </a:rPr>
+              <a:t>Yes</a:t>
+            </a:r>
+            <a:r>
+              <a:rPr lang="en-US" sz="1550" spc="-1" dirty="0">
+                <a:solidFill>
+                  <a:prstClr val="black"/>
+                </a:solidFill>
+                <a:latin typeface="Arial Nova Light"/>
+              </a:rPr>
+              <a:t>. We successfully developed a Random Forest Classifier that achieved 89.75% accuracy at predicting whether a song would be "Popular" (1) or "Not Popular" (0).</a:t>
             </a:r>
           </a:p>
         </p:txBody>
@@ -17912,7 +17984,7 @@
         <p:spPr>
           <a:xfrm>
             <a:off x="366258" y="5213404"/>
-            <a:ext cx="5400716" cy="0"/>
+            <a:ext cx="6863486" cy="0"/>
           </a:xfrm>
           <a:prstGeom prst="line">
             <a:avLst/>
@@ -17970,7 +18042,7 @@
                 </a:solidFill>
                 <a:latin typeface="Space Mono" panose="02000509040000020004" charset="0"/>
               </a:rPr>
-              <a:t>Authors</a:t>
+              <a:t>Author:</a:t>
             </a:r>
           </a:p>
         </p:txBody>
@@ -17984,7 +18056,7 @@
         <p:spPr>
           <a:xfrm>
             <a:off x="366257" y="5930846"/>
-            <a:ext cx="4548864" cy="221214"/>
+            <a:ext cx="4548864" cy="244298"/>
           </a:xfrm>
           <a:prstGeom prst="rect">
             <a:avLst/>
@@ -18005,7 +18077,7 @@
               </a:spcBef>
             </a:pPr>
             <a:r>
-              <a:rPr lang="en-US" sz="1500" dirty="0">
+              <a:rPr lang="en-US" sz="2400" b="1" dirty="0">
                 <a:solidFill>
                   <a:srgbClr val="FFFFFF"/>
                 </a:solidFill>
@@ -18024,7 +18096,7 @@
         </p:nvSpPr>
         <p:spPr>
           <a:xfrm>
-            <a:off x="366257" y="6527338"/>
+            <a:off x="264121" y="6417267"/>
             <a:ext cx="4548864" cy="325089"/>
           </a:xfrm>
           <a:prstGeom prst="rect">
@@ -18065,8 +18137,8 @@
         </p:nvSpPr>
         <p:spPr>
           <a:xfrm>
-            <a:off x="366257" y="6952873"/>
-            <a:ext cx="6984424" cy="708527"/>
+            <a:off x="335287" y="6842805"/>
+            <a:ext cx="6984424" cy="1231106"/>
           </a:xfrm>
           <a:prstGeom prst="rect">
             <a:avLst/>
@@ -18079,15 +18151,12 @@
           <a:lstStyle/>
           <a:p>
             <a:pPr defTabSz="593844">
-              <a:lnSpc>
-                <a:spcPts val="1909"/>
-              </a:lnSpc>
               <a:spcBef>
                 <a:spcPct val="0"/>
               </a:spcBef>
             </a:pPr>
             <a:r>
-              <a:rPr lang="en-US" sz="1500" dirty="0">
+              <a:rPr lang="en-US" sz="2000" dirty="0">
                 <a:solidFill>
                   <a:srgbClr val="FFFFFF"/>
                 </a:solidFill>
@@ -18141,7 +18210,7 @@
         <p:spPr>
           <a:xfrm>
             <a:off x="7753850" y="1265475"/>
-            <a:ext cx="6864742" cy="2430474"/>
+            <a:ext cx="6864742" cy="3645485"/>
           </a:xfrm>
           <a:prstGeom prst="rect">
             <a:avLst/>
@@ -18162,14 +18231,68 @@
               </a:spcBef>
             </a:pPr>
             <a:r>
-              <a:rPr lang="en-US" sz="1550" spc="-1" dirty="0">
+              <a:rPr lang="en-US" sz="1600" b="1" spc="-1" dirty="0">
                 <a:solidFill>
                   <a:prstClr val="black"/>
                 </a:solidFill>
                 <a:latin typeface="Arial Nova Light"/>
                 <a:ea typeface="DejaVu Sans"/>
               </a:rPr>
-              <a:t>Spotify's digital marketplace creates intense competition where over 100,000 tracks are uploaded daily. </a:t>
+              <a:t>Overview of Spotify’s Digital Marketplace</a:t>
+            </a:r>
+          </a:p>
+          <a:p>
+            <a:pPr marL="285750" indent="-285750" algn="just" defTabSz="593844">
+              <a:lnSpc>
+                <a:spcPts val="2364"/>
+              </a:lnSpc>
+              <a:spcBef>
+                <a:spcPct val="0"/>
+              </a:spcBef>
+              <a:buFont typeface="Arial" panose="020B0604020202020204" pitchFamily="34" charset="0"/>
+              <a:buChar char="•"/>
+            </a:pPr>
+            <a:r>
+              <a:rPr lang="pt-BR" sz="1600" spc="-1" dirty="0" err="1">
+                <a:solidFill>
+                  <a:prstClr val="black"/>
+                </a:solidFill>
+                <a:latin typeface="Arial Nova Light"/>
+                <a:ea typeface="DejaVu Sans"/>
+              </a:rPr>
+              <a:t>Thousands</a:t>
+            </a:r>
+            <a:r>
+              <a:rPr lang="en-US" sz="1600" spc="-1" dirty="0">
+                <a:solidFill>
+                  <a:prstClr val="black"/>
+                </a:solidFill>
+                <a:latin typeface="Arial Nova Light"/>
+                <a:ea typeface="DejaVu Sans"/>
+              </a:rPr>
+              <a:t> new tracks uploaded daily.</a:t>
+            </a:r>
+          </a:p>
+          <a:p>
+            <a:pPr marL="285750" indent="-285750" algn="just" defTabSz="593844">
+              <a:lnSpc>
+                <a:spcPts val="2364"/>
+              </a:lnSpc>
+              <a:spcBef>
+                <a:spcPct val="0"/>
+              </a:spcBef>
+              <a:buFont typeface="Arial" panose="020B0604020202020204" pitchFamily="34" charset="0"/>
+              <a:buChar char="•"/>
+            </a:pPr>
+            <a:r>
+              <a:rPr lang="en-US" sz="1600" spc="-1" dirty="0">
+                <a:solidFill>
+                  <a:prstClr val="black"/>
+                </a:solidFill>
+                <a:latin typeface="Arial Nova Light"/>
+                <a:ea typeface="DejaVu Sans"/>
+              </a:rPr>
+              <a:t>Intense competition among artists.</a:t>
             </a:r>
           </a:p>
           <a:p>
@@ -18182,16 +18305,188 @@
               </a:spcBef>
             </a:pPr>
             <a:r>
-              <a:rPr lang="en-US" sz="1550" spc="-1" dirty="0">
+              <a:rPr lang="en-US" sz="1600" b="1" spc="-1" dirty="0">
                 <a:solidFill>
                   <a:prstClr val="black"/>
                 </a:solidFill>
                 <a:latin typeface="Arial Nova Light"/>
                 <a:ea typeface="DejaVu Sans"/>
               </a:rPr>
-              <a:t>Artists struggle with music discovery in this saturated environment. While creativity remains essential, understanding the data-driven mechanics behind successful songs provides strategic advantage. This study analyzes 4,829 Spotify tracks using machine learning to identify which audio features and metadata characteristics distinguish hit songs from less popular tracks, moving from intuition to evidence-based production decisions.</a:t>
-            </a:r>
-            <a:endParaRPr lang="en-US" sz="1550" spc="-1" dirty="0">
+              <a:t>Challenge: Music Discovery and Artist Visibility</a:t>
+            </a:r>
+          </a:p>
+          <a:p>
+            <a:pPr marL="285750" indent="-285750" algn="just" defTabSz="593844">
+              <a:lnSpc>
+                <a:spcPts val="2364"/>
+              </a:lnSpc>
+              <a:spcBef>
+                <a:spcPct val="0"/>
+              </a:spcBef>
+              <a:buFont typeface="Arial" panose="020B0604020202020204" pitchFamily="34" charset="0"/>
+              <a:buChar char="•"/>
+            </a:pPr>
+            <a:r>
+              <a:rPr lang="en-US" sz="1600" spc="-1" dirty="0">
+                <a:solidFill>
+                  <a:prstClr val="black"/>
+                </a:solidFill>
+                <a:latin typeface="Arial Nova Light"/>
+                <a:ea typeface="DejaVu Sans"/>
+              </a:rPr>
+              <a:t>Difficulty for artists to stand out.</a:t>
+            </a:r>
+          </a:p>
+          <a:p>
+            <a:pPr marL="285750" indent="-285750" algn="just" defTabSz="593844">
+              <a:lnSpc>
+                <a:spcPts val="2364"/>
+              </a:lnSpc>
+              <a:spcBef>
+                <a:spcPct val="0"/>
+              </a:spcBef>
+              <a:buFont typeface="Arial" panose="020B0604020202020204" pitchFamily="34" charset="0"/>
+              <a:buChar char="•"/>
+            </a:pPr>
+            <a:r>
+              <a:rPr lang="en-US" sz="1600" spc="-1" dirty="0">
+                <a:solidFill>
+                  <a:prstClr val="black"/>
+                </a:solidFill>
+                <a:latin typeface="Arial Nova Light"/>
+                <a:ea typeface="DejaVu Sans"/>
+              </a:rPr>
+              <a:t>Importance of effective discovery strategies.</a:t>
+            </a:r>
+          </a:p>
+          <a:p>
+            <a:pPr algn="just" defTabSz="593844">
+              <a:lnSpc>
+                <a:spcPts val="2364"/>
+              </a:lnSpc>
+              <a:spcBef>
+                <a:spcPct val="0"/>
+              </a:spcBef>
+            </a:pPr>
+            <a:r>
+              <a:rPr lang="en-US" sz="1600" b="1" spc="-1" dirty="0">
+                <a:solidFill>
+                  <a:prstClr val="black"/>
+                </a:solidFill>
+                <a:latin typeface="Arial Nova Light"/>
+                <a:ea typeface="DejaVu Sans"/>
+              </a:rPr>
+              <a:t>Shift from Creativity to Data-Driven Strategy</a:t>
+            </a:r>
+          </a:p>
+          <a:p>
+            <a:pPr marL="285750" indent="-285750" algn="just" defTabSz="593844">
+              <a:lnSpc>
+                <a:spcPts val="2364"/>
+              </a:lnSpc>
+              <a:spcBef>
+                <a:spcPct val="0"/>
+              </a:spcBef>
+              <a:buFont typeface="Arial" panose="020B0604020202020204" pitchFamily="34" charset="0"/>
+              <a:buChar char="•"/>
+            </a:pPr>
+            <a:r>
+              <a:rPr lang="en-US" sz="1600" spc="-1" dirty="0">
+                <a:solidFill>
+                  <a:prstClr val="black"/>
+                </a:solidFill>
+                <a:latin typeface="Arial Nova Light"/>
+                <a:ea typeface="DejaVu Sans"/>
+              </a:rPr>
+              <a:t>Creativity still matters, but data analysis offers an edge.</a:t>
+            </a:r>
+          </a:p>
+          <a:p>
+            <a:pPr marL="285750" indent="-285750" algn="just" defTabSz="593844">
+              <a:lnSpc>
+                <a:spcPts val="2364"/>
+              </a:lnSpc>
+              <a:spcBef>
+                <a:spcPct val="0"/>
+              </a:spcBef>
+              <a:buFont typeface="Arial" panose="020B0604020202020204" pitchFamily="34" charset="0"/>
+              <a:buChar char="•"/>
+            </a:pPr>
+            <a:r>
+              <a:rPr lang="en-US" sz="1600" spc="-1" dirty="0">
+                <a:solidFill>
+                  <a:prstClr val="black"/>
+                </a:solidFill>
+                <a:latin typeface="Arial Nova Light"/>
+                <a:ea typeface="DejaVu Sans"/>
+              </a:rPr>
+              <a:t>Understanding what makes tracks successful.</a:t>
+            </a:r>
+          </a:p>
+          <a:p>
+            <a:pPr algn="just" defTabSz="593844">
+              <a:lnSpc>
+                <a:spcPts val="2364"/>
+              </a:lnSpc>
+              <a:spcBef>
+                <a:spcPct val="0"/>
+              </a:spcBef>
+            </a:pPr>
+            <a:r>
+              <a:rPr lang="en-US" sz="1600" b="1" spc="-1" dirty="0">
+                <a:solidFill>
+                  <a:prstClr val="black"/>
+                </a:solidFill>
+                <a:latin typeface="Arial Nova Light"/>
+                <a:ea typeface="DejaVu Sans"/>
+              </a:rPr>
+              <a:t>Goal and Insight</a:t>
+            </a:r>
+          </a:p>
+          <a:p>
+            <a:pPr marL="285750" indent="-285750" algn="just" defTabSz="593844">
+              <a:lnSpc>
+                <a:spcPts val="2364"/>
+              </a:lnSpc>
+              <a:spcBef>
+                <a:spcPct val="0"/>
+              </a:spcBef>
+              <a:buFont typeface="Arial" panose="020B0604020202020204" pitchFamily="34" charset="0"/>
+              <a:buChar char="•"/>
+            </a:pPr>
+            <a:r>
+              <a:rPr lang="en-US" sz="1600" spc="-1" dirty="0">
+                <a:solidFill>
+                  <a:prstClr val="black"/>
+                </a:solidFill>
+                <a:latin typeface="Arial Nova Light"/>
+                <a:ea typeface="DejaVu Sans"/>
+              </a:rPr>
+              <a:t>Identify audio and metadata features that define hit songs.</a:t>
+            </a:r>
+          </a:p>
+          <a:p>
+            <a:pPr marL="285750" indent="-285750" algn="just" defTabSz="593844">
+              <a:lnSpc>
+                <a:spcPts val="2364"/>
+              </a:lnSpc>
+              <a:spcBef>
+                <a:spcPct val="0"/>
+              </a:spcBef>
+              <a:buFont typeface="Arial" panose="020B0604020202020204" pitchFamily="34" charset="0"/>
+              <a:buChar char="•"/>
+            </a:pPr>
+            <a:r>
+              <a:rPr lang="en-US" sz="1600" spc="-1" dirty="0">
+                <a:solidFill>
+                  <a:prstClr val="black"/>
+                </a:solidFill>
+                <a:latin typeface="Arial Nova Light"/>
+                <a:ea typeface="DejaVu Sans"/>
+              </a:rPr>
+              <a:t>Move from intuition to evidence-based production decisions.</a:t>
+            </a:r>
+            <a:endParaRPr lang="en-US" sz="1600" spc="-1" dirty="0">
               <a:solidFill>
                 <a:prstClr val="black"/>
               </a:solidFill>
@@ -18215,7 +18510,7 @@
           <p:nvPr/>
         </p:nvPicPr>
         <p:blipFill rotWithShape="1">
-          <a:blip r:embed="rId5">
+          <a:blip r:embed="rId4">
             <a:duotone>
               <a:schemeClr val="bg2">
                 <a:shade val="45000"/>
@@ -18226,7 +18521,7 @@
             <a:extLst>
               <a:ext uri="{BEBA8EAE-BF5A-486C-A8C5-ECC9F3942E4B}">
                 <a14:imgProps xmlns:a14="http://schemas.microsoft.com/office/drawing/2010/main">
-                  <a14:imgLayer r:embed="rId6">
+                  <a14:imgLayer r:embed="rId5">
                     <a14:imgEffect>
                       <a14:colorTemperature colorTemp="6600"/>
                     </a14:imgEffect>
@@ -18249,7 +18544,7 @@
         </p:blipFill>
         <p:spPr bwMode="auto">
           <a:xfrm>
-            <a:off x="384919" y="18689830"/>
+            <a:off x="100709" y="18689830"/>
             <a:ext cx="7195148" cy="2880000"/>
           </a:xfrm>
           <a:prstGeom prst="rect">
@@ -18281,8 +18576,8 @@
         </p:nvGrpSpPr>
         <p:grpSpPr>
           <a:xfrm>
-            <a:off x="7774588" y="8351094"/>
-            <a:ext cx="6799730" cy="1080000"/>
+            <a:off x="7624918" y="9936873"/>
+            <a:ext cx="6663649" cy="916626"/>
             <a:chOff x="8018428" y="912724"/>
             <a:chExt cx="6799730" cy="1080000"/>
           </a:xfrm>
@@ -18531,8 +18826,8 @@
         </p:nvGrpSpPr>
         <p:grpSpPr>
           <a:xfrm>
-            <a:off x="22959860" y="14176995"/>
-            <a:ext cx="6799730" cy="1080000"/>
+            <a:off x="22924490" y="14283219"/>
+            <a:ext cx="6663649" cy="916626"/>
             <a:chOff x="8018428" y="912724"/>
             <a:chExt cx="6799730" cy="1080000"/>
           </a:xfrm>
@@ -18687,7 +18982,7 @@
           <p:spPr>
             <a:xfrm>
               <a:off x="8267668" y="1227462"/>
-              <a:ext cx="614708" cy="552908"/>
+              <a:ext cx="614708" cy="651455"/>
             </a:xfrm>
             <a:prstGeom prst="rect">
               <a:avLst/>
@@ -18714,7 +19009,7 @@
                   </a:solidFill>
                   <a:latin typeface="Space Mono" panose="020B0604020202020204" charset="0"/>
                 </a:rPr>
-                <a:t>05</a:t>
+                <a:t>04</a:t>
               </a:r>
             </a:p>
           </p:txBody>
@@ -18781,8 +19076,8 @@
         </p:nvSpPr>
         <p:spPr>
           <a:xfrm>
-            <a:off x="7869600" y="10244335"/>
-            <a:ext cx="4556861" cy="1107996"/>
+            <a:off x="7869600" y="10811603"/>
+            <a:ext cx="6320533" cy="553998"/>
           </a:xfrm>
           <a:prstGeom prst="rect">
             <a:avLst/>
@@ -18820,8 +19115,8 @@
         </p:nvSpPr>
         <p:spPr>
           <a:xfrm>
-            <a:off x="7774588" y="5126283"/>
-            <a:ext cx="6951264" cy="2872581"/>
+            <a:off x="7774588" y="6667223"/>
+            <a:ext cx="6951264" cy="2626360"/>
           </a:xfrm>
           <a:prstGeom prst="rect">
             <a:avLst/>
@@ -18845,13 +19140,22 @@
               </a:tabLst>
             </a:pPr>
             <a:r>
-              <a:rPr lang="en-US" sz="1600" spc="-1" dirty="0">
+              <a:rPr lang="en-US" sz="1600" b="1" spc="-1" dirty="0">
                 <a:solidFill>
                   <a:prstClr val="black"/>
                 </a:solidFill>
                 <a:latin typeface="Arial Nova Light"/>
               </a:rPr>
-              <a:t>Identify statistical relationships between audio features (danceability, energy, loudness, valence) and song popularity classification</a:t>
+              <a:t>Identify</a:t>
+            </a:r>
+            <a:r>
+              <a:rPr lang="en-US" sz="1600" spc="-1" dirty="0">
+                <a:solidFill>
+                  <a:prstClr val="black"/>
+                </a:solidFill>
+                <a:latin typeface="Arial Nova Light"/>
+              </a:rPr>
+              <a:t> statistical relationships between audio features (danceability, energy, loudness, valence) and song popularity classification</a:t>
             </a:r>
           </a:p>
           <a:p>
@@ -18867,13 +19171,22 @@
               </a:tabLst>
             </a:pPr>
             <a:r>
-              <a:rPr lang="en-US" sz="1600" spc="-1" dirty="0">
+              <a:rPr lang="en-US" sz="1600" b="1" spc="-1" dirty="0">
                 <a:solidFill>
                   <a:prstClr val="black"/>
                 </a:solidFill>
                 <a:latin typeface="Arial Nova Light"/>
               </a:rPr>
-              <a:t>Analyze structural elements including tempo, duration, key, mode, and release timing for correlation with success</a:t>
+              <a:t>Analyze</a:t>
+            </a:r>
+            <a:r>
+              <a:rPr lang="en-US" sz="1600" spc="-1" dirty="0">
+                <a:solidFill>
+                  <a:prstClr val="black"/>
+                </a:solidFill>
+                <a:latin typeface="Arial Nova Light"/>
+              </a:rPr>
+              <a:t> structural elements including tempo, duration, key, mode, and release timing for correlation with success</a:t>
             </a:r>
           </a:p>
           <a:p>
@@ -18889,13 +19202,22 @@
               </a:tabLst>
             </a:pPr>
             <a:r>
-              <a:rPr lang="en-US" sz="1600" spc="-1" dirty="0">
+              <a:rPr lang="en-US" sz="1600" b="1" spc="-1" dirty="0">
                 <a:solidFill>
                   <a:prstClr val="black"/>
                 </a:solidFill>
                 <a:latin typeface="Arial Nova Light"/>
               </a:rPr>
-              <a:t>Develop accurate ML models to predict high popularity songs based on intrinsic features</a:t>
+              <a:t>Develop</a:t>
+            </a:r>
+            <a:r>
+              <a:rPr lang="en-US" sz="1600" spc="-1" dirty="0">
+                <a:solidFill>
+                  <a:prstClr val="black"/>
+                </a:solidFill>
+                <a:latin typeface="Arial Nova Light"/>
+              </a:rPr>
+              <a:t> accurate ML models to predict high popularity songs based on intrinsic features</a:t>
             </a:r>
           </a:p>
           <a:p>
@@ -18911,13 +19233,22 @@
               </a:tabLst>
             </a:pPr>
             <a:r>
-              <a:rPr lang="en-IE" sz="1600" spc="-1" dirty="0">
+              <a:rPr lang="en-IE" sz="1600" b="1" spc="-1" dirty="0">
                 <a:solidFill>
                   <a:prstClr val="black"/>
                 </a:solidFill>
                 <a:latin typeface="Arial Nova Light"/>
               </a:rPr>
-              <a:t>Compare and choose the best of three machine learning models (KNN, Decision Tree, SVM).</a:t>
+              <a:t>Compare</a:t>
+            </a:r>
+            <a:r>
+              <a:rPr lang="en-IE" sz="1600" spc="-1" dirty="0">
+                <a:solidFill>
+                  <a:prstClr val="black"/>
+                </a:solidFill>
+                <a:latin typeface="Arial Nova Light"/>
+              </a:rPr>
+              <a:t> and choose the best of three machine learning models</a:t>
             </a:r>
           </a:p>
           <a:p>
@@ -18933,13 +19264,22 @@
               </a:tabLst>
             </a:pPr>
             <a:r>
-              <a:rPr lang="en-US" sz="1600" spc="-1" dirty="0">
+              <a:rPr lang="en-US" sz="1600" b="1" spc="-1" dirty="0">
                 <a:solidFill>
                   <a:prstClr val="black"/>
                 </a:solidFill>
                 <a:latin typeface="Arial Nova Light"/>
               </a:rPr>
-              <a:t>Extract actionable insights and strategic recommendations for artists and producers to increase competitive advantage</a:t>
+              <a:t>Extract actionable insights and strategic recommendations</a:t>
+            </a:r>
+            <a:r>
+              <a:rPr lang="en-US" sz="1600" spc="-1" dirty="0">
+                <a:solidFill>
+                  <a:prstClr val="black"/>
+                </a:solidFill>
+                <a:latin typeface="Arial Nova Light"/>
+              </a:rPr>
+              <a:t> for artists and producers to increase competitive advantage</a:t>
             </a:r>
             <a:endParaRPr lang="en-IE" sz="1600" spc="-1" dirty="0">
               <a:solidFill>
@@ -18964,8 +19304,8 @@
         </p:nvGrpSpPr>
         <p:grpSpPr>
           <a:xfrm>
-            <a:off x="7774588" y="4006493"/>
-            <a:ext cx="6799730" cy="1080000"/>
+            <a:off x="7653493" y="5567932"/>
+            <a:ext cx="6663649" cy="916626"/>
             <a:chOff x="8018428" y="912724"/>
             <a:chExt cx="6799730" cy="1080000"/>
           </a:xfrm>
@@ -19367,7 +19707,7 @@
         </p:nvSpPr>
         <p:spPr>
           <a:xfrm>
-            <a:off x="15189866" y="215907"/>
+            <a:off x="7944376" y="16638973"/>
             <a:ext cx="6627170" cy="538609"/>
           </a:xfrm>
           <a:prstGeom prst="rect">
@@ -19400,146 +19740,59 @@
           </a:p>
         </p:txBody>
       </p:sp>
-      <p:grpSp>
-        <p:nvGrpSpPr>
-          <p:cNvPr id="1042" name="Group 1041">
+      <p:sp>
+        <p:nvSpPr>
+          <p:cNvPr id="1041" name="TextBox 47">
             <a:extLst>
               <a:ext uri="{FF2B5EF4-FFF2-40B4-BE49-F238E27FC236}">
-                <a16:creationId xmlns:a16="http://schemas.microsoft.com/office/drawing/2014/main" id="{7D367C03-4057-9FA1-C177-B58044661FD7}"/>
+                <a16:creationId xmlns:a16="http://schemas.microsoft.com/office/drawing/2014/main" id="{A31C42DB-3943-2AD4-6578-EDBD35A60BAB}"/>
               </a:ext>
             </a:extLst>
           </p:cNvPr>
-          <p:cNvGrpSpPr>
-            <a:grpSpLocks noChangeAspect="1"/>
-          </p:cNvGrpSpPr>
+          <p:cNvSpPr/>
           <p:nvPr/>
-        </p:nvGrpSpPr>
-        <p:grpSpPr>
-          <a:xfrm>
-            <a:off x="11786386" y="9172146"/>
-            <a:ext cx="4506351" cy="3006153"/>
-            <a:chOff x="11407254" y="10592731"/>
-            <a:chExt cx="5396554" cy="3600000"/>
+        </p:nvSpPr>
+        <p:spPr>
+          <a:xfrm flipH="1">
+            <a:off x="14123242" y="11799457"/>
+            <a:ext cx="2169496" cy="231728"/>
           </a:xfrm>
-        </p:grpSpPr>
-        <p:pic>
-          <p:nvPicPr>
-            <p:cNvPr id="1030" name="Picture 6" descr="The CRISP-DM model (Cross Industry Standard Process for Data Mining) offers a very good opportunity in surface technology to map and process data mining projects in a meaningful way.">
-              <a:extLst>
-                <a:ext uri="{FF2B5EF4-FFF2-40B4-BE49-F238E27FC236}">
-                  <a16:creationId xmlns:a16="http://schemas.microsoft.com/office/drawing/2014/main" id="{9FAD8448-D98D-1B50-6C69-429B11130F22}"/>
-                </a:ext>
-              </a:extLst>
-            </p:cNvPr>
-            <p:cNvPicPr>
-              <a:picLocks noChangeAspect="1" noChangeArrowheads="1"/>
-            </p:cNvPicPr>
-            <p:nvPr/>
-          </p:nvPicPr>
-          <p:blipFill rotWithShape="1">
-            <a:blip r:embed="rId7" cstate="print">
-              <a:clrChange>
-                <a:clrFrom>
-                  <a:srgbClr val="FFFFFF"/>
-                </a:clrFrom>
-                <a:clrTo>
-                  <a:srgbClr val="FFFFFF">
-                    <a:alpha val="0"/>
-                  </a:srgbClr>
-                </a:clrTo>
-              </a:clrChange>
-              <a:extLst>
-                <a:ext uri="{BEBA8EAE-BF5A-486C-A8C5-ECC9F3942E4B}">
-                  <a14:imgProps xmlns:a14="http://schemas.microsoft.com/office/drawing/2010/main">
-                    <a14:imgLayer r:embed="rId8">
-                      <a14:imgEffect>
-                        <a14:brightnessContrast contrast="-40000"/>
-                      </a14:imgEffect>
-                    </a14:imgLayer>
-                  </a14:imgProps>
-                </a:ext>
-                <a:ext uri="{28A0092B-C50C-407E-A947-70E740481C1C}">
-                  <a14:useLocalDpi xmlns:a14="http://schemas.microsoft.com/office/drawing/2010/main" val="0"/>
-                </a:ext>
-              </a:extLst>
-            </a:blip>
-            <a:srcRect l="12431" r="8376"/>
-            <a:stretch/>
-          </p:blipFill>
-          <p:spPr bwMode="auto">
-            <a:xfrm>
-              <a:off x="11407254" y="10592731"/>
-              <a:ext cx="3801272" cy="3600000"/>
-            </a:xfrm>
-            <a:prstGeom prst="rect">
-              <a:avLst/>
-            </a:prstGeom>
+          <a:prstGeom prst="rect">
+            <a:avLst/>
+          </a:prstGeom>
+          <a:noFill/>
+          <a:ln w="0">
             <a:noFill/>
-            <a:extLst>
-              <a:ext uri="{909E8E84-426E-40DD-AFC4-6F175D3DCCD1}">
-                <a14:hiddenFill xmlns:a14="http://schemas.microsoft.com/office/drawing/2010/main">
-                  <a:solidFill>
-                    <a:srgbClr val="FFFFFF"/>
-                  </a:solidFill>
-                </a14:hiddenFill>
-              </a:ext>
-            </a:extLst>
-          </p:spPr>
-        </p:pic>
-        <p:sp>
-          <p:nvSpPr>
-            <p:cNvPr id="1041" name="TextBox 47">
-              <a:extLst>
-                <a:ext uri="{FF2B5EF4-FFF2-40B4-BE49-F238E27FC236}">
-                  <a16:creationId xmlns:a16="http://schemas.microsoft.com/office/drawing/2014/main" id="{A31C42DB-3943-2AD4-6578-EDBD35A60BAB}"/>
-                </a:ext>
-              </a:extLst>
-            </p:cNvPr>
-            <p:cNvSpPr/>
-            <p:nvPr/>
-          </p:nvSpPr>
-          <p:spPr>
-            <a:xfrm flipH="1">
-              <a:off x="14205741" y="13739079"/>
-              <a:ext cx="2598067" cy="277505"/>
-            </a:xfrm>
-            <a:prstGeom prst="rect">
-              <a:avLst/>
-            </a:prstGeom>
-            <a:noFill/>
-            <a:ln w="0">
-              <a:noFill/>
-            </a:ln>
-          </p:spPr>
-          <p:style>
-            <a:lnRef idx="0">
-              <a:scrgbClr r="0" g="0" b="0"/>
-            </a:lnRef>
-            <a:fillRef idx="0">
-              <a:scrgbClr r="0" g="0" b="0"/>
-            </a:fillRef>
-            <a:effectRef idx="0">
-              <a:scrgbClr r="0" g="0" b="0"/>
-            </a:effectRef>
-            <a:fontRef idx="minor"/>
-          </p:style>
-          <p:txBody>
-            <a:bodyPr wrap="square" lIns="58464" tIns="29232" rIns="58464" bIns="29232" anchor="t">
-              <a:spAutoFit/>
-            </a:bodyPr>
-            <a:lstStyle/>
-            <a:p>
-              <a:pPr defTabSz="2850938"/>
-              <a:endParaRPr lang="es-MX" sz="1600" spc="-1" dirty="0">
-                <a:solidFill>
-                  <a:srgbClr val="FFFFFF"/>
-                </a:solidFill>
-                <a:latin typeface="Arial"/>
-              </a:endParaRPr>
-            </a:p>
-          </p:txBody>
-        </p:sp>
-      </p:grpSp>
+          </a:ln>
+        </p:spPr>
+        <p:style>
+          <a:lnRef idx="0">
+            <a:scrgbClr r="0" g="0" b="0"/>
+          </a:lnRef>
+          <a:fillRef idx="0">
+            <a:scrgbClr r="0" g="0" b="0"/>
+          </a:fillRef>
+          <a:effectRef idx="0">
+            <a:scrgbClr r="0" g="0" b="0"/>
+          </a:effectRef>
+          <a:fontRef idx="minor"/>
+        </p:style>
+        <p:txBody>
+          <a:bodyPr wrap="square" lIns="58464" tIns="29232" rIns="58464" bIns="29232" anchor="t">
+            <a:spAutoFit/>
+          </a:bodyPr>
+          <a:lstStyle/>
+          <a:p>
+            <a:pPr defTabSz="2850938"/>
+            <a:endParaRPr lang="es-MX" sz="1600" spc="-1" dirty="0">
+              <a:solidFill>
+                <a:srgbClr val="FFFFFF"/>
+              </a:solidFill>
+              <a:latin typeface="Arial"/>
+            </a:endParaRPr>
+          </a:p>
+        </p:txBody>
+      </p:sp>
       <p:sp>
         <p:nvSpPr>
           <p:cNvPr id="1045" name="TextBox 99">
@@ -19554,8 +19807,8 @@
         </p:nvSpPr>
         <p:spPr>
           <a:xfrm>
-            <a:off x="15189866" y="3431734"/>
-            <a:ext cx="6823998" cy="4065408"/>
+            <a:off x="15189866" y="866334"/>
+            <a:ext cx="6823998" cy="3699346"/>
           </a:xfrm>
           <a:prstGeom prst="rect">
             <a:avLst/>
@@ -19706,22 +19959,6 @@
                 <a:spcPts val="800"/>
               </a:spcAft>
             </a:pPr>
-            <a:endParaRPr lang="en-IE" sz="1600" spc="-1" dirty="0">
-              <a:solidFill>
-                <a:prstClr val="black"/>
-              </a:solidFill>
-              <a:latin typeface="Arial Nova Light"/>
-            </a:endParaRPr>
-          </a:p>
-          <a:p>
-            <a:pPr algn="just">
-              <a:lnSpc>
-                <a:spcPct val="107000"/>
-              </a:lnSpc>
-              <a:spcAft>
-                <a:spcPts val="800"/>
-              </a:spcAft>
-            </a:pPr>
             <a:r>
               <a:rPr lang="en-IE" sz="1600" b="1" spc="-1" dirty="0">
                 <a:solidFill>
@@ -19744,13 +19981,22 @@
               <a:buChar char="•"/>
             </a:pPr>
             <a:r>
-              <a:rPr lang="en-IE" sz="1600" spc="-1" dirty="0">
+              <a:rPr lang="en-IE" sz="1600" b="1" spc="-1" dirty="0">
                 <a:solidFill>
                   <a:prstClr val="black"/>
                 </a:solidFill>
                 <a:latin typeface="Arial Nova Light"/>
               </a:rPr>
-              <a:t>Key: Musical key (C, C#, D, etc.)​​</a:t>
+              <a:t>Key</a:t>
+            </a:r>
+            <a:r>
+              <a:rPr lang="en-IE" sz="1600" spc="-1" dirty="0">
+                <a:solidFill>
+                  <a:prstClr val="black"/>
+                </a:solidFill>
+                <a:latin typeface="Arial Nova Light"/>
+              </a:rPr>
+              <a:t>: Musical key (C, C#, D, etc.)​​</a:t>
             </a:r>
           </a:p>
           <a:p>
@@ -19765,13 +20011,22 @@
               <a:buChar char="•"/>
             </a:pPr>
             <a:r>
-              <a:rPr lang="en-IE" sz="1600" spc="-1" dirty="0">
+              <a:rPr lang="en-IE" sz="1600" b="1" spc="-1" dirty="0">
                 <a:solidFill>
                   <a:prstClr val="black"/>
                 </a:solidFill>
                 <a:latin typeface="Arial Nova Light"/>
               </a:rPr>
-              <a:t>Mode: Major or Minor tonality​​</a:t>
+              <a:t>Mode</a:t>
+            </a:r>
+            <a:r>
+              <a:rPr lang="en-IE" sz="1600" spc="-1" dirty="0">
+                <a:solidFill>
+                  <a:prstClr val="black"/>
+                </a:solidFill>
+                <a:latin typeface="Arial Nova Light"/>
+              </a:rPr>
+              <a:t>: Major or Minor tonality​​</a:t>
             </a:r>
           </a:p>
           <a:p>
@@ -19786,13 +20041,22 @@
               <a:buChar char="•"/>
             </a:pPr>
             <a:r>
-              <a:rPr lang="en-IE" sz="1600" spc="-1" dirty="0">
+              <a:rPr lang="en-IE" sz="1600" b="1" spc="-1" dirty="0">
                 <a:solidFill>
                   <a:prstClr val="black"/>
                 </a:solidFill>
                 <a:latin typeface="Arial Nova Light"/>
               </a:rPr>
-              <a:t>Time Signature: Beats per measure​​</a:t>
+              <a:t>Time Signature</a:t>
+            </a:r>
+            <a:r>
+              <a:rPr lang="en-IE" sz="1600" spc="-1" dirty="0">
+                <a:solidFill>
+                  <a:prstClr val="black"/>
+                </a:solidFill>
+                <a:latin typeface="Arial Nova Light"/>
+              </a:rPr>
+              <a:t>: Beats per measure​​</a:t>
             </a:r>
           </a:p>
           <a:p>
@@ -19807,7 +20071,7 @@
               <a:buChar char="•"/>
             </a:pPr>
             <a:r>
-              <a:rPr lang="en-IE" sz="1600" spc="-1" dirty="0" err="1">
+              <a:rPr lang="en-IE" sz="1600" b="1" spc="-1" dirty="0" err="1">
                 <a:solidFill>
                   <a:prstClr val="black"/>
                 </a:solidFill>
@@ -19837,13 +20101,22 @@
               <a:buChar char="•"/>
             </a:pPr>
             <a:r>
-              <a:rPr lang="en-IE" sz="1600" spc="-1" dirty="0">
+              <a:rPr lang="en-IE" sz="1600" b="1" spc="-1" dirty="0">
                 <a:solidFill>
                   <a:prstClr val="black"/>
                 </a:solidFill>
                 <a:latin typeface="Arial Nova Light"/>
               </a:rPr>
-              <a:t>Artist, Album, Track Name: Identifiers (removed for </a:t>
+              <a:t>Artist, Album, Track Name</a:t>
+            </a:r>
+            <a:r>
+              <a:rPr lang="en-IE" sz="1600" spc="-1" dirty="0">
+                <a:solidFill>
+                  <a:prstClr val="black"/>
+                </a:solidFill>
+                <a:latin typeface="Arial Nova Light"/>
+              </a:rPr>
+              <a:t>: Identifiers (removed for </a:t>
             </a:r>
             <a:r>
               <a:rPr lang="en-IE" sz="1600" spc="-1" dirty="0" err="1">
@@ -19886,8 +20159,8 @@
         </p:nvSpPr>
         <p:spPr>
           <a:xfrm>
-            <a:off x="15172287" y="2851440"/>
-            <a:ext cx="4882302" cy="538609"/>
+            <a:off x="15172286" y="286040"/>
+            <a:ext cx="6325841" cy="566437"/>
           </a:xfrm>
           <a:prstGeom prst="rect">
             <a:avLst/>
@@ -19908,604 +20181,13 @@
               </a:spcBef>
             </a:pPr>
             <a:r>
-              <a:rPr lang="en-US" sz="3500" b="1" spc="100" dirty="0">
+              <a:rPr lang="en-US" sz="4800" b="1" spc="100" dirty="0">
                 <a:solidFill>
                   <a:srgbClr val="04B0A0"/>
                 </a:solidFill>
                 <a:latin typeface="Space Mono" panose="020B0604020202020204" charset="0"/>
               </a:rPr>
               <a:t>DATA UNDERSTANDING</a:t>
-            </a:r>
-          </a:p>
-        </p:txBody>
-      </p:sp>
-      <p:sp>
-        <p:nvSpPr>
-          <p:cNvPr id="1050" name="TextBox 68">
-            <a:extLst>
-              <a:ext uri="{FF2B5EF4-FFF2-40B4-BE49-F238E27FC236}">
-                <a16:creationId xmlns:a16="http://schemas.microsoft.com/office/drawing/2014/main" id="{6282B53E-C6AB-7F17-45E0-62C32C92F50F}"/>
-              </a:ext>
-            </a:extLst>
-          </p:cNvPr>
-          <p:cNvSpPr txBox="1"/>
-          <p:nvPr/>
-        </p:nvSpPr>
-        <p:spPr>
-          <a:xfrm>
-            <a:off x="7823560" y="11395904"/>
-            <a:ext cx="6864742" cy="7392088"/>
-          </a:xfrm>
-          <a:prstGeom prst="rect">
-            <a:avLst/>
-          </a:prstGeom>
-        </p:spPr>
-        <p:txBody>
-          <a:bodyPr wrap="square" lIns="0" tIns="0" rIns="0" bIns="0" rtlCol="0" anchor="t">
-            <a:spAutoFit/>
-          </a:bodyPr>
-          <a:lstStyle/>
-          <a:p>
-            <a:pPr>
-              <a:lnSpc>
-                <a:spcPct val="107000"/>
-              </a:lnSpc>
-              <a:spcAft>
-                <a:spcPts val="800"/>
-              </a:spcAft>
-            </a:pPr>
-            <a:r>
-              <a:rPr lang="en-IE" sz="1550" b="1" spc="-1" dirty="0">
-                <a:solidFill>
-                  <a:prstClr val="black"/>
-                </a:solidFill>
-                <a:latin typeface="Arial Nova Light"/>
-              </a:rPr>
-              <a:t>1. Business Understanding</a:t>
-            </a:r>
-          </a:p>
-          <a:p>
-            <a:pPr marL="285750" indent="-285750">
-              <a:lnSpc>
-                <a:spcPct val="107000"/>
-              </a:lnSpc>
-              <a:spcAft>
-                <a:spcPts val="800"/>
-              </a:spcAft>
-              <a:buFont typeface="Arial" panose="020B0604020202020204" pitchFamily="34" charset="0"/>
-              <a:buChar char="•"/>
-            </a:pPr>
-            <a:r>
-              <a:rPr lang="en-IE" sz="1550" spc="-1" dirty="0">
-                <a:solidFill>
-                  <a:prstClr val="black"/>
-                </a:solidFill>
-                <a:latin typeface="Arial Nova Light"/>
-              </a:rPr>
-              <a:t>Problem: Music discovery challenge in saturated </a:t>
-            </a:r>
-          </a:p>
-          <a:p>
-            <a:pPr marL="285750" indent="-285750">
-              <a:lnSpc>
-                <a:spcPct val="107000"/>
-              </a:lnSpc>
-              <a:spcAft>
-                <a:spcPts val="800"/>
-              </a:spcAft>
-              <a:buFont typeface="Arial" panose="020B0604020202020204" pitchFamily="34" charset="0"/>
-              <a:buChar char="•"/>
-            </a:pPr>
-            <a:r>
-              <a:rPr lang="en-IE" sz="1550" spc="-1" dirty="0">
-                <a:solidFill>
-                  <a:prstClr val="black"/>
-                </a:solidFill>
-                <a:latin typeface="Arial Nova Light"/>
-              </a:rPr>
-              <a:t>digital marketplace​​</a:t>
-            </a:r>
-          </a:p>
-          <a:p>
-            <a:pPr marL="285750" indent="-285750">
-              <a:lnSpc>
-                <a:spcPct val="107000"/>
-              </a:lnSpc>
-              <a:spcAft>
-                <a:spcPts val="800"/>
-              </a:spcAft>
-              <a:buFont typeface="Arial" panose="020B0604020202020204" pitchFamily="34" charset="0"/>
-              <a:buChar char="•"/>
-            </a:pPr>
-            <a:r>
-              <a:rPr lang="en-IE" sz="1550" spc="-1" dirty="0">
-                <a:solidFill>
-                  <a:prstClr val="black"/>
-                </a:solidFill>
-                <a:latin typeface="Arial Nova Light"/>
-              </a:rPr>
-              <a:t>Goal: Identify data-driven characteristics of successful songs​​</a:t>
-            </a:r>
-          </a:p>
-          <a:p>
-            <a:pPr>
-              <a:lnSpc>
-                <a:spcPct val="107000"/>
-              </a:lnSpc>
-              <a:spcAft>
-                <a:spcPts val="800"/>
-              </a:spcAft>
-            </a:pPr>
-            <a:r>
-              <a:rPr lang="en-IE" sz="1550" b="1" spc="-1" dirty="0">
-                <a:solidFill>
-                  <a:prstClr val="black"/>
-                </a:solidFill>
-                <a:latin typeface="Arial Nova Light"/>
-              </a:rPr>
-              <a:t>2. Data Understanding</a:t>
-            </a:r>
-          </a:p>
-          <a:p>
-            <a:pPr marL="285750" indent="-285750">
-              <a:lnSpc>
-                <a:spcPct val="107000"/>
-              </a:lnSpc>
-              <a:spcAft>
-                <a:spcPts val="800"/>
-              </a:spcAft>
-              <a:buFont typeface="Arial" panose="020B0604020202020204" pitchFamily="34" charset="0"/>
-              <a:buChar char="•"/>
-            </a:pPr>
-            <a:r>
-              <a:rPr lang="en-IE" sz="1550" spc="-1" dirty="0">
-                <a:solidFill>
-                  <a:prstClr val="black"/>
-                </a:solidFill>
-                <a:latin typeface="Arial Nova Light"/>
-              </a:rPr>
-              <a:t>Source: Kaggle Spotify Music Dataset (public, Spotify API)​​</a:t>
-            </a:r>
-          </a:p>
-          <a:p>
-            <a:pPr marL="285750" indent="-285750">
-              <a:lnSpc>
-                <a:spcPct val="107000"/>
-              </a:lnSpc>
-              <a:spcAft>
-                <a:spcPts val="800"/>
-              </a:spcAft>
-              <a:buFont typeface="Arial" panose="020B0604020202020204" pitchFamily="34" charset="0"/>
-              <a:buChar char="•"/>
-            </a:pPr>
-            <a:r>
-              <a:rPr lang="en-IE" sz="1550" spc="-1" dirty="0">
-                <a:solidFill>
-                  <a:prstClr val="black"/>
-                </a:solidFill>
-                <a:latin typeface="Arial Nova Light"/>
-              </a:rPr>
-              <a:t>Sample: 4,829 tracks (high/low popularity)​​</a:t>
-            </a:r>
-          </a:p>
-          <a:p>
-            <a:pPr marL="285750" indent="-285750">
-              <a:lnSpc>
-                <a:spcPct val="107000"/>
-              </a:lnSpc>
-              <a:spcAft>
-                <a:spcPts val="800"/>
-              </a:spcAft>
-              <a:buFont typeface="Arial" panose="020B0604020202020204" pitchFamily="34" charset="0"/>
-              <a:buChar char="•"/>
-            </a:pPr>
-            <a:r>
-              <a:rPr lang="en-IE" sz="1550" spc="-1" dirty="0">
-                <a:solidFill>
-                  <a:prstClr val="black"/>
-                </a:solidFill>
-                <a:latin typeface="Arial Nova Light"/>
-              </a:rPr>
-              <a:t>Features: 25 variables (audio + metadata)​​</a:t>
-            </a:r>
-          </a:p>
-          <a:p>
-            <a:pPr>
-              <a:lnSpc>
-                <a:spcPct val="107000"/>
-              </a:lnSpc>
-              <a:spcAft>
-                <a:spcPts val="800"/>
-              </a:spcAft>
-            </a:pPr>
-            <a:r>
-              <a:rPr lang="en-IE" sz="1550" b="1" spc="-1" dirty="0">
-                <a:solidFill>
-                  <a:prstClr val="black"/>
-                </a:solidFill>
-                <a:latin typeface="Arial Nova Light"/>
-              </a:rPr>
-              <a:t>3. Data Preparation</a:t>
-            </a:r>
-          </a:p>
-          <a:p>
-            <a:pPr marL="285750" indent="-285750">
-              <a:lnSpc>
-                <a:spcPct val="107000"/>
-              </a:lnSpc>
-              <a:spcAft>
-                <a:spcPts val="800"/>
-              </a:spcAft>
-              <a:buFont typeface="Arial" panose="020B0604020202020204" pitchFamily="34" charset="0"/>
-              <a:buChar char="•"/>
-            </a:pPr>
-            <a:r>
-              <a:rPr lang="en-IE" sz="1550" spc="-1" dirty="0">
-                <a:solidFill>
-                  <a:prstClr val="black"/>
-                </a:solidFill>
-                <a:latin typeface="Arial Nova Light"/>
-              </a:rPr>
-              <a:t>created binary target (1=high, 0=low)​​</a:t>
-            </a:r>
-          </a:p>
-          <a:p>
-            <a:pPr marL="285750" indent="-285750">
-              <a:lnSpc>
-                <a:spcPct val="107000"/>
-              </a:lnSpc>
-              <a:spcAft>
-                <a:spcPts val="800"/>
-              </a:spcAft>
-              <a:buFont typeface="Arial" panose="020B0604020202020204" pitchFamily="34" charset="0"/>
-              <a:buChar char="•"/>
-            </a:pPr>
-            <a:r>
-              <a:rPr lang="en-IE" sz="1550" spc="-1" dirty="0">
-                <a:solidFill>
-                  <a:prstClr val="black"/>
-                </a:solidFill>
-                <a:latin typeface="Arial Nova Light"/>
-              </a:rPr>
-              <a:t>Removed </a:t>
-            </a:r>
-            <a:r>
-              <a:rPr lang="en-IE" sz="1550" spc="-1" dirty="0" err="1">
-                <a:solidFill>
-                  <a:prstClr val="black"/>
-                </a:solidFill>
-                <a:latin typeface="Arial Nova Light"/>
-              </a:rPr>
-              <a:t>NaN</a:t>
-            </a:r>
-            <a:r>
-              <a:rPr lang="en-IE" sz="1550" spc="-1" dirty="0">
-                <a:solidFill>
-                  <a:prstClr val="black"/>
-                </a:solidFill>
-                <a:latin typeface="Arial Nova Light"/>
-              </a:rPr>
-              <a:t> values and duplicates​​</a:t>
-            </a:r>
-          </a:p>
-          <a:p>
-            <a:pPr marL="285750" indent="-285750">
-              <a:lnSpc>
-                <a:spcPct val="107000"/>
-              </a:lnSpc>
-              <a:spcAft>
-                <a:spcPts val="800"/>
-              </a:spcAft>
-              <a:buFont typeface="Arial" panose="020B0604020202020204" pitchFamily="34" charset="0"/>
-              <a:buChar char="•"/>
-            </a:pPr>
-            <a:r>
-              <a:rPr lang="en-IE" sz="1550" spc="-1" dirty="0">
-                <a:solidFill>
-                  <a:prstClr val="black"/>
-                </a:solidFill>
-                <a:latin typeface="Arial Nova Light"/>
-              </a:rPr>
-              <a:t>Feature engineering: extracted </a:t>
-            </a:r>
-            <a:r>
-              <a:rPr lang="en-IE" sz="1550" spc="-1" dirty="0" err="1">
-                <a:solidFill>
-                  <a:prstClr val="black"/>
-                </a:solidFill>
-                <a:latin typeface="Arial Nova Light"/>
-              </a:rPr>
-              <a:t>release_year</a:t>
-            </a:r>
-            <a:r>
-              <a:rPr lang="en-IE" sz="1550" spc="-1" dirty="0">
-                <a:solidFill>
-                  <a:prstClr val="black"/>
-                </a:solidFill>
-                <a:latin typeface="Arial Nova Light"/>
-              </a:rPr>
-              <a:t>, </a:t>
-            </a:r>
-            <a:r>
-              <a:rPr lang="en-IE" sz="1550" spc="-1" dirty="0" err="1">
-                <a:solidFill>
-                  <a:prstClr val="black"/>
-                </a:solidFill>
-                <a:latin typeface="Arial Nova Light"/>
-              </a:rPr>
-              <a:t>release_month</a:t>
-            </a:r>
-            <a:r>
-              <a:rPr lang="en-IE" sz="1550" spc="-1" dirty="0">
-                <a:solidFill>
-                  <a:prstClr val="black"/>
-                </a:solidFill>
-                <a:latin typeface="Arial Nova Light"/>
-              </a:rPr>
-              <a:t>, </a:t>
-            </a:r>
-            <a:r>
-              <a:rPr lang="en-IE" sz="1550" spc="-1" dirty="0" err="1">
-                <a:solidFill>
-                  <a:prstClr val="black"/>
-                </a:solidFill>
-                <a:latin typeface="Arial Nova Light"/>
-              </a:rPr>
-              <a:t>release_day</a:t>
-            </a:r>
-            <a:r>
-              <a:rPr lang="en-IE" sz="1550" spc="-1" dirty="0">
-                <a:solidFill>
-                  <a:prstClr val="black"/>
-                </a:solidFill>
-                <a:latin typeface="Arial Nova Light"/>
-              </a:rPr>
-              <a:t>​​</a:t>
-            </a:r>
-          </a:p>
-          <a:p>
-            <a:pPr marL="285750" indent="-285750">
-              <a:lnSpc>
-                <a:spcPct val="107000"/>
-              </a:lnSpc>
-              <a:spcAft>
-                <a:spcPts val="800"/>
-              </a:spcAft>
-              <a:buFont typeface="Arial" panose="020B0604020202020204" pitchFamily="34" charset="0"/>
-              <a:buChar char="•"/>
-            </a:pPr>
-            <a:r>
-              <a:rPr lang="en-IE" sz="1550" spc="-1" dirty="0" err="1">
-                <a:solidFill>
-                  <a:prstClr val="black"/>
-                </a:solidFill>
-                <a:latin typeface="Arial Nova Light"/>
-              </a:rPr>
-              <a:t>MinMaxScaler</a:t>
-            </a:r>
-            <a:r>
-              <a:rPr lang="en-IE" sz="1550" spc="-1" dirty="0">
-                <a:solidFill>
-                  <a:prstClr val="black"/>
-                </a:solidFill>
-                <a:latin typeface="Arial Nova Light"/>
-              </a:rPr>
-              <a:t> normalization (0-1 range)​​</a:t>
-            </a:r>
-          </a:p>
-          <a:p>
-            <a:pPr marL="285750" indent="-285750">
-              <a:lnSpc>
-                <a:spcPct val="107000"/>
-              </a:lnSpc>
-              <a:spcAft>
-                <a:spcPts val="800"/>
-              </a:spcAft>
-              <a:buFont typeface="Arial" panose="020B0604020202020204" pitchFamily="34" charset="0"/>
-              <a:buChar char="•"/>
-            </a:pPr>
-            <a:r>
-              <a:rPr lang="en-IE" sz="1550" spc="-1" dirty="0">
-                <a:solidFill>
-                  <a:prstClr val="black"/>
-                </a:solidFill>
-                <a:latin typeface="Arial Nova Light"/>
-              </a:rPr>
-              <a:t>Outlier detection via IQR method​​</a:t>
-            </a:r>
-          </a:p>
-          <a:p>
-            <a:pPr>
-              <a:lnSpc>
-                <a:spcPct val="107000"/>
-              </a:lnSpc>
-              <a:spcAft>
-                <a:spcPts val="800"/>
-              </a:spcAft>
-            </a:pPr>
-            <a:r>
-              <a:rPr lang="en-IE" sz="1550" b="1" spc="-1" dirty="0">
-                <a:solidFill>
-                  <a:prstClr val="black"/>
-                </a:solidFill>
-                <a:latin typeface="Arial Nova Light"/>
-              </a:rPr>
-              <a:t>4. </a:t>
-            </a:r>
-            <a:r>
-              <a:rPr lang="en-IE" sz="1550" b="1" spc="-1" dirty="0" err="1">
-                <a:solidFill>
-                  <a:prstClr val="black"/>
-                </a:solidFill>
-                <a:latin typeface="Arial Nova Light"/>
-              </a:rPr>
-              <a:t>Modeling</a:t>
-            </a:r>
-            <a:endParaRPr lang="en-IE" sz="1550" b="1" spc="-1" dirty="0">
-              <a:solidFill>
-                <a:prstClr val="black"/>
-              </a:solidFill>
-              <a:latin typeface="Arial Nova Light"/>
-            </a:endParaRPr>
-          </a:p>
-          <a:p>
-            <a:pPr marL="285750" indent="-285750">
-              <a:lnSpc>
-                <a:spcPct val="107000"/>
-              </a:lnSpc>
-              <a:spcAft>
-                <a:spcPts val="800"/>
-              </a:spcAft>
-              <a:buFont typeface="Arial" panose="020B0604020202020204" pitchFamily="34" charset="0"/>
-              <a:buChar char="•"/>
-            </a:pPr>
-            <a:r>
-              <a:rPr lang="en-IE" sz="1550" spc="-1" dirty="0">
-                <a:solidFill>
-                  <a:prstClr val="black"/>
-                </a:solidFill>
-                <a:latin typeface="Arial Nova Light"/>
-              </a:rPr>
-              <a:t>Algorithms: Random Forest, Gradient Boosting, SVC, </a:t>
-            </a:r>
-            <a:r>
-              <a:rPr lang="en-IE" sz="1550" spc="-1" dirty="0" err="1">
-                <a:solidFill>
-                  <a:prstClr val="black"/>
-                </a:solidFill>
-                <a:latin typeface="Arial Nova Light"/>
-              </a:rPr>
-              <a:t>XGBoost</a:t>
-            </a:r>
-            <a:r>
-              <a:rPr lang="en-IE" sz="1550" spc="-1" dirty="0">
-                <a:solidFill>
-                  <a:prstClr val="black"/>
-                </a:solidFill>
-                <a:latin typeface="Arial Nova Light"/>
-              </a:rPr>
-              <a:t>​​</a:t>
-            </a:r>
-          </a:p>
-          <a:p>
-            <a:pPr marL="285750" indent="-285750">
-              <a:lnSpc>
-                <a:spcPct val="107000"/>
-              </a:lnSpc>
-              <a:spcAft>
-                <a:spcPts val="800"/>
-              </a:spcAft>
-              <a:buFont typeface="Arial" panose="020B0604020202020204" pitchFamily="34" charset="0"/>
-              <a:buChar char="•"/>
-            </a:pPr>
-            <a:r>
-              <a:rPr lang="en-IE" sz="1550" spc="-1" dirty="0">
-                <a:solidFill>
-                  <a:prstClr val="black"/>
-                </a:solidFill>
-                <a:latin typeface="Arial Nova Light"/>
-              </a:rPr>
-              <a:t>Optimization: </a:t>
-            </a:r>
-            <a:r>
-              <a:rPr lang="en-IE" sz="1550" spc="-1" dirty="0" err="1">
-                <a:solidFill>
-                  <a:prstClr val="black"/>
-                </a:solidFill>
-                <a:latin typeface="Arial Nova Light"/>
-              </a:rPr>
-              <a:t>GridSearchCV</a:t>
-            </a:r>
-            <a:r>
-              <a:rPr lang="en-IE" sz="1550" spc="-1" dirty="0">
-                <a:solidFill>
-                  <a:prstClr val="black"/>
-                </a:solidFill>
-                <a:latin typeface="Arial Nova Light"/>
-              </a:rPr>
-              <a:t> hyperparameter tuning​​</a:t>
-            </a:r>
-          </a:p>
-          <a:p>
-            <a:pPr marL="285750" indent="-285750">
-              <a:lnSpc>
-                <a:spcPct val="107000"/>
-              </a:lnSpc>
-              <a:spcAft>
-                <a:spcPts val="800"/>
-              </a:spcAft>
-              <a:buFont typeface="Arial" panose="020B0604020202020204" pitchFamily="34" charset="0"/>
-              <a:buChar char="•"/>
-            </a:pPr>
-            <a:r>
-              <a:rPr lang="en-IE" sz="1550" spc="-1" dirty="0">
-                <a:solidFill>
-                  <a:prstClr val="black"/>
-                </a:solidFill>
-                <a:latin typeface="Arial Nova Light"/>
-              </a:rPr>
-              <a:t>Metrics: Accuracy, Precision, Recall, F1-Score, Cross-validation​​</a:t>
-            </a:r>
-          </a:p>
-          <a:p>
-            <a:pPr>
-              <a:lnSpc>
-                <a:spcPct val="107000"/>
-              </a:lnSpc>
-              <a:spcAft>
-                <a:spcPts val="800"/>
-              </a:spcAft>
-            </a:pPr>
-            <a:r>
-              <a:rPr lang="en-IE" sz="1550" b="1" spc="-1" dirty="0">
-                <a:solidFill>
-                  <a:prstClr val="black"/>
-                </a:solidFill>
-                <a:latin typeface="Arial Nova Light"/>
-              </a:rPr>
-              <a:t>5. Evaluation</a:t>
-            </a:r>
-          </a:p>
-          <a:p>
-            <a:pPr marL="285750" indent="-285750">
-              <a:lnSpc>
-                <a:spcPct val="107000"/>
-              </a:lnSpc>
-              <a:spcAft>
-                <a:spcPts val="800"/>
-              </a:spcAft>
-              <a:buFont typeface="Arial" panose="020B0604020202020204" pitchFamily="34" charset="0"/>
-              <a:buChar char="•"/>
-            </a:pPr>
-            <a:r>
-              <a:rPr lang="en-IE" sz="1550" spc="-1" dirty="0">
-                <a:solidFill>
-                  <a:prstClr val="black"/>
-                </a:solidFill>
-                <a:latin typeface="Arial Nova Light"/>
-              </a:rPr>
-              <a:t>Confusion matrix analysis​​</a:t>
-            </a:r>
-          </a:p>
-          <a:p>
-            <a:pPr marL="285750" indent="-285750">
-              <a:lnSpc>
-                <a:spcPct val="107000"/>
-              </a:lnSpc>
-              <a:spcAft>
-                <a:spcPts val="800"/>
-              </a:spcAft>
-              <a:buFont typeface="Arial" panose="020B0604020202020204" pitchFamily="34" charset="0"/>
-              <a:buChar char="•"/>
-            </a:pPr>
-            <a:r>
-              <a:rPr lang="en-IE" sz="1550" spc="-1" dirty="0">
-                <a:solidFill>
-                  <a:prstClr val="black"/>
-                </a:solidFill>
-                <a:latin typeface="Arial Nova Light"/>
-              </a:rPr>
-              <a:t>Model comparison and selection</a:t>
             </a:r>
           </a:p>
         </p:txBody>
@@ -20524,8 +20206,8 @@
         </p:nvSpPr>
         <p:spPr>
           <a:xfrm>
-            <a:off x="22924227" y="603050"/>
-            <a:ext cx="5342838" cy="1125373"/>
+            <a:off x="23015667" y="223739"/>
+            <a:ext cx="6904348" cy="590162"/>
           </a:xfrm>
           <a:prstGeom prst="rect">
             <a:avLst/>
@@ -20552,7 +20234,7 @@
                 </a:solidFill>
                 <a:latin typeface="Space Mono" panose="020B0604020202020204" charset="0"/>
               </a:rPr>
-              <a:t>Modeling &amp; Results</a:t>
+              <a:t>Modeling &amp; Evaluation</a:t>
             </a:r>
           </a:p>
         </p:txBody>
@@ -20571,8 +20253,8 @@
         </p:nvSpPr>
         <p:spPr>
           <a:xfrm>
-            <a:off x="22917525" y="18699859"/>
-            <a:ext cx="6986847" cy="2677656"/>
+            <a:off x="22917525" y="20249263"/>
+            <a:ext cx="6986847" cy="1138773"/>
           </a:xfrm>
           <a:prstGeom prst="rect">
             <a:avLst/>
@@ -20596,7 +20278,7 @@
             </a:r>
           </a:p>
           <a:p>
-            <a:pPr algn="r"/>
+            <a:pPr algn="just"/>
             <a:endParaRPr lang="en-US" sz="1000" spc="-1" dirty="0">
               <a:solidFill>
                 <a:prstClr val="black"/>
@@ -20610,13 +20292,22 @@
               <a:buChar char="•"/>
             </a:pPr>
             <a:r>
-              <a:rPr lang="en-US" sz="1000" spc="-1" dirty="0">
+              <a:rPr lang="en-US" sz="1000" spc="-1" dirty="0" err="1">
                 <a:solidFill>
                   <a:prstClr val="black"/>
                 </a:solidFill>
                 <a:latin typeface="Arial Nova Light"/>
               </a:rPr>
-              <a:t>Davenport, T.H. and Harris, J.G. (2007). Competing on Analytics. Harvard Business Press.​</a:t>
+              <a:t>FrancescaLazzeri</a:t>
+            </a:r>
+            <a:r>
+              <a:rPr lang="en-US" sz="1000" spc="-1" dirty="0">
+                <a:solidFill>
+                  <a:prstClr val="black"/>
+                </a:solidFill>
+                <a:latin typeface="Arial Nova Light"/>
+              </a:rPr>
+              <a:t> (2022). Deep Learning vs. Machine Learning - Azure Machine Learning.​</a:t>
             </a:r>
           </a:p>
           <a:p>
@@ -20636,30 +20327,6 @@
               <a:buFont typeface="Arial" panose="020B0604020202020204" pitchFamily="34" charset="0"/>
               <a:buChar char="•"/>
             </a:pPr>
-            <a:r>
-              <a:rPr lang="en-US" sz="1000" spc="-1" dirty="0" err="1">
-                <a:solidFill>
-                  <a:prstClr val="black"/>
-                </a:solidFill>
-                <a:latin typeface="Arial Nova Light"/>
-              </a:rPr>
-              <a:t>Diakopoulos</a:t>
-            </a:r>
-            <a:r>
-              <a:rPr lang="en-US" sz="1000" spc="-1" dirty="0">
-                <a:solidFill>
-                  <a:prstClr val="black"/>
-                </a:solidFill>
-                <a:latin typeface="Arial Nova Light"/>
-              </a:rPr>
-              <a:t>, N. (2014). Algorithmic Accountability: The Investigation of Black Boxes. Tow Center for Digital Journalism.​</a:t>
-            </a:r>
-          </a:p>
-          <a:p>
-            <a:pPr marL="171450" indent="-171450" algn="just">
-              <a:buFont typeface="Arial" panose="020B0604020202020204" pitchFamily="34" charset="0"/>
-              <a:buChar char="•"/>
-            </a:pPr>
             <a:endParaRPr lang="en-US" sz="1000" spc="-1" dirty="0">
               <a:solidFill>
                 <a:prstClr val="black"/>
@@ -20673,158 +20340,23 @@
               <a:buChar char="•"/>
             </a:pPr>
             <a:r>
-              <a:rPr lang="en-US" sz="1000" spc="-1" dirty="0" err="1">
+              <a:rPr lang="en-US" sz="1000" spc="-1" dirty="0">
                 <a:solidFill>
                   <a:prstClr val="black"/>
                 </a:solidFill>
                 <a:latin typeface="Arial Nova Light"/>
               </a:rPr>
-              <a:t>FrancescaLazzeri</a:t>
-            </a:r>
-            <a:r>
-              <a:rPr lang="en-US" sz="1000" spc="-1" dirty="0">
-                <a:solidFill>
-                  <a:prstClr val="black"/>
-                </a:solidFill>
-                <a:latin typeface="Arial Nova Light"/>
-              </a:rPr>
-              <a:t> (2022). Deep Learning vs. Machine Learning - Azure Machine Learning.​</a:t>
-            </a:r>
-          </a:p>
-          <a:p>
-            <a:pPr marL="171450" indent="-171450" algn="just">
-              <a:buFont typeface="Arial" panose="020B0604020202020204" pitchFamily="34" charset="0"/>
-              <a:buChar char="•"/>
-            </a:pPr>
+              <a:t>Kateri, A. and Kateri, M. (2024). Foundations of Statistics for Data Scientists. CRC Press.​</a:t>
+            </a:r>
+          </a:p>
+          <a:p>
+            <a:pPr algn="just"/>
             <a:endParaRPr lang="en-US" sz="1000" spc="-1" dirty="0">
               <a:solidFill>
                 <a:prstClr val="black"/>
               </a:solidFill>
               <a:latin typeface="Arial Nova Light"/>
             </a:endParaRPr>
-          </a:p>
-          <a:p>
-            <a:pPr marL="171450" indent="-171450" algn="just">
-              <a:buFont typeface="Arial" panose="020B0604020202020204" pitchFamily="34" charset="0"/>
-              <a:buChar char="•"/>
-            </a:pPr>
-            <a:r>
-              <a:rPr lang="en-US" sz="1000" spc="-1" dirty="0">
-                <a:solidFill>
-                  <a:prstClr val="black"/>
-                </a:solidFill>
-                <a:latin typeface="Arial Nova Light"/>
-              </a:rPr>
-              <a:t>Gupta, B.B. and Mamta (2023). Big Data Management and Analytics. World Scientific.​</a:t>
-            </a:r>
-          </a:p>
-          <a:p>
-            <a:pPr marL="171450" indent="-171450" algn="just">
-              <a:buFont typeface="Arial" panose="020B0604020202020204" pitchFamily="34" charset="0"/>
-              <a:buChar char="•"/>
-            </a:pPr>
-            <a:endParaRPr lang="en-US" sz="1000" spc="-1" dirty="0">
-              <a:solidFill>
-                <a:prstClr val="black"/>
-              </a:solidFill>
-              <a:latin typeface="Arial Nova Light"/>
-            </a:endParaRPr>
-          </a:p>
-          <a:p>
-            <a:pPr marL="171450" indent="-171450" algn="just">
-              <a:buFont typeface="Arial" panose="020B0604020202020204" pitchFamily="34" charset="0"/>
-              <a:buChar char="•"/>
-            </a:pPr>
-            <a:r>
-              <a:rPr lang="en-US" sz="1000" spc="-1" dirty="0">
-                <a:solidFill>
-                  <a:prstClr val="black"/>
-                </a:solidFill>
-                <a:latin typeface="Arial Nova Light"/>
-              </a:rPr>
-              <a:t>Indeed Career Guide (n.d.). How To Calculate Statistical Significance Plus What It Is and Why It's Important.​</a:t>
-            </a:r>
-          </a:p>
-          <a:p>
-            <a:pPr marL="171450" indent="-171450" algn="just">
-              <a:buFont typeface="Arial" panose="020B0604020202020204" pitchFamily="34" charset="0"/>
-              <a:buChar char="•"/>
-            </a:pPr>
-            <a:endParaRPr lang="en-US" sz="1000" spc="-1" dirty="0">
-              <a:solidFill>
-                <a:prstClr val="black"/>
-              </a:solidFill>
-              <a:latin typeface="Arial Nova Light"/>
-            </a:endParaRPr>
-          </a:p>
-          <a:p>
-            <a:pPr marL="171450" indent="-171450" algn="just">
-              <a:buFont typeface="Arial" panose="020B0604020202020204" pitchFamily="34" charset="0"/>
-              <a:buChar char="•"/>
-            </a:pPr>
-            <a:r>
-              <a:rPr lang="en-US" sz="1000" spc="-1" dirty="0">
-                <a:solidFill>
-                  <a:prstClr val="black"/>
-                </a:solidFill>
-                <a:latin typeface="Arial Nova Light"/>
-              </a:rPr>
-              <a:t>Johnson, G. and Scholes, K. (1993). Exploring Corporate Strategy. Prentice Hall.​</a:t>
-            </a:r>
-          </a:p>
-          <a:p>
-            <a:pPr marL="171450" indent="-171450" algn="just">
-              <a:buFont typeface="Arial" panose="020B0604020202020204" pitchFamily="34" charset="0"/>
-              <a:buChar char="•"/>
-            </a:pPr>
-            <a:endParaRPr lang="en-US" sz="1000" spc="-1" dirty="0">
-              <a:solidFill>
-                <a:prstClr val="black"/>
-              </a:solidFill>
-              <a:latin typeface="Arial Nova Light"/>
-            </a:endParaRPr>
-          </a:p>
-          <a:p>
-            <a:pPr marL="171450" indent="-171450" algn="just">
-              <a:buFont typeface="Arial" panose="020B0604020202020204" pitchFamily="34" charset="0"/>
-              <a:buChar char="•"/>
-            </a:pPr>
-            <a:r>
-              <a:rPr lang="en-US" sz="1000" spc="-1" dirty="0">
-                <a:solidFill>
-                  <a:prstClr val="black"/>
-                </a:solidFill>
-                <a:latin typeface="Arial Nova Light"/>
-              </a:rPr>
-              <a:t>Kateri, A. and Kateri, M. (2024). Foundations of Statistics for Data Scientists. CRC Press.​</a:t>
-            </a:r>
-          </a:p>
-          <a:p>
-            <a:pPr marL="171450" indent="-171450" algn="just">
-              <a:buFont typeface="Arial" panose="020B0604020202020204" pitchFamily="34" charset="0"/>
-              <a:buChar char="•"/>
-            </a:pPr>
-            <a:endParaRPr lang="en-US" sz="1000" spc="-1" dirty="0">
-              <a:solidFill>
-                <a:prstClr val="black"/>
-              </a:solidFill>
-              <a:latin typeface="Arial Nova Light"/>
-            </a:endParaRPr>
-          </a:p>
-          <a:p>
-            <a:pPr marL="171450" indent="-171450" algn="just">
-              <a:buFont typeface="Arial" panose="020B0604020202020204" pitchFamily="34" charset="0"/>
-              <a:buChar char="•"/>
-            </a:pPr>
-            <a:r>
-              <a:rPr lang="en-US" sz="1000" spc="-1" dirty="0">
-                <a:solidFill>
-                  <a:prstClr val="black"/>
-                </a:solidFill>
-                <a:latin typeface="Arial Nova Light"/>
-              </a:rPr>
-              <a:t>Porter, M.E. (2008). 'The Five Forces that Shape Strategy', Harvard Business Review.​</a:t>
-            </a:r>
           </a:p>
         </p:txBody>
       </p:sp>
@@ -20842,7 +20374,7 @@
         </p:nvSpPr>
         <p:spPr>
           <a:xfrm>
-            <a:off x="254706" y="8074224"/>
+            <a:off x="258461" y="8074224"/>
             <a:ext cx="4548864" cy="325089"/>
           </a:xfrm>
           <a:prstGeom prst="rect">
@@ -20870,7 +20402,7 @@
                 </a:solidFill>
                 <a:latin typeface="Space Mono" panose="02000509040000020004" charset="0"/>
               </a:rPr>
-              <a:t>Research Question</a:t>
+              <a:t>Research Questions</a:t>
             </a:r>
           </a:p>
         </p:txBody>
@@ -20889,8 +20421,8 @@
         </p:nvSpPr>
         <p:spPr>
           <a:xfrm>
-            <a:off x="266437" y="8489604"/>
-            <a:ext cx="6723262" cy="2414122"/>
+            <a:off x="235467" y="8379533"/>
+            <a:ext cx="6838464" cy="4431983"/>
           </a:xfrm>
           <a:prstGeom prst="rect">
             <a:avLst/>
@@ -20903,28 +20435,22 @@
           <a:lstStyle/>
           <a:p>
             <a:pPr algn="just" defTabSz="593844">
-              <a:lnSpc>
-                <a:spcPts val="1909"/>
-              </a:lnSpc>
               <a:spcBef>
                 <a:spcPct val="0"/>
               </a:spcBef>
             </a:pPr>
             <a:r>
-              <a:rPr lang="en-US" sz="1500" dirty="0">
+              <a:rPr lang="en-US" sz="2400" dirty="0">
                 <a:solidFill>
                   <a:srgbClr val="FFFFFF"/>
                 </a:solidFill>
-                <a:latin typeface="Barlow Medium"/>
+                <a:latin typeface="+mj-lt"/>
               </a:rPr>
-              <a:t>The following research questions guide the focus of this study:</a:t>
+              <a:t>Question 1: </a:t>
             </a:r>
           </a:p>
           <a:p>
             <a:pPr marL="285750" indent="-285750" algn="just" defTabSz="593844">
-              <a:lnSpc>
-                <a:spcPts val="1909"/>
-              </a:lnSpc>
               <a:spcBef>
                 <a:spcPct val="0"/>
               </a:spcBef>
@@ -20932,38 +20458,67 @@
               <a:buChar char="•"/>
             </a:pPr>
             <a:r>
-              <a:rPr lang="en-US" sz="1500" dirty="0">
+              <a:rPr lang="en-US" sz="2400" b="1" dirty="0">
                 <a:solidFill>
                   <a:srgbClr val="FFFFFF"/>
                 </a:solidFill>
-                <a:latin typeface="Barlow Medium"/>
+                <a:latin typeface="+mj-lt"/>
               </a:rPr>
-              <a:t>Q1: Can intrinsic audio features (danceability, energy, loudness, tempo) and metadata (release year, key, mode) predict whether a song achieves high popularity on Spotify?</a:t>
+              <a:t>Can intrinsic audio features (danceability, energy, loudness, tempo) and metadata (release year, key, mode) predict whether a song achieves high popularity on Spotify?</a:t>
+            </a:r>
+          </a:p>
+          <a:p>
+            <a:pPr algn="just" defTabSz="593844">
+              <a:spcBef>
+                <a:spcPct val="0"/>
+              </a:spcBef>
+            </a:pPr>
+            <a:r>
+              <a:rPr lang="en-US" sz="2400" dirty="0">
+                <a:solidFill>
+                  <a:srgbClr val="FFFFFF"/>
+                </a:solidFill>
+                <a:latin typeface="+mj-lt"/>
+              </a:rPr>
+              <a:t>Question 2: </a:t>
             </a:r>
           </a:p>
           <a:p>
             <a:pPr marL="285750" indent="-285750" algn="just" defTabSz="593844">
-              <a:lnSpc>
-                <a:spcPts val="1909"/>
-              </a:lnSpc>
               <a:spcBef>
                 <a:spcPct val="0"/>
               </a:spcBef>
               <a:buFont typeface="Arial" panose="020B0604020202020204" pitchFamily="34" charset="0"/>
               <a:buChar char="•"/>
             </a:pPr>
-            <a:endParaRPr lang="en-US" sz="1500" dirty="0">
-              <a:solidFill>
-                <a:srgbClr val="FFFFFF"/>
-              </a:solidFill>
-              <a:latin typeface="Barlow Medium"/>
-            </a:endParaRPr>
+            <a:r>
+              <a:rPr lang="en-US" sz="2400" b="1" dirty="0">
+                <a:solidFill>
+                  <a:srgbClr val="FFFFFF"/>
+                </a:solidFill>
+                <a:latin typeface="+mj-lt"/>
+              </a:rPr>
+              <a:t>Do structural elements like duration, tempo, and key show a significant correlation with popularity?</a:t>
+            </a:r>
+          </a:p>
+          <a:p>
+            <a:pPr algn="just" defTabSz="593844">
+              <a:spcBef>
+                <a:spcPct val="0"/>
+              </a:spcBef>
+            </a:pPr>
+            <a:r>
+              <a:rPr lang="en-US" sz="2400" dirty="0">
+                <a:solidFill>
+                  <a:srgbClr val="FFFFFF"/>
+                </a:solidFill>
+                <a:latin typeface="+mj-lt"/>
+              </a:rPr>
+              <a:t>Question 3: </a:t>
+            </a:r>
           </a:p>
           <a:p>
             <a:pPr marL="285750" indent="-285750" algn="just" defTabSz="593844">
-              <a:lnSpc>
-                <a:spcPts val="1909"/>
-              </a:lnSpc>
               <a:spcBef>
                 <a:spcPct val="0"/>
               </a:spcBef>
@@ -20971,52 +20526,13 @@
               <a:buChar char="•"/>
             </a:pPr>
             <a:r>
-              <a:rPr lang="en-US" sz="1500" dirty="0">
+              <a:rPr lang="en-US" sz="2400" b="1" dirty="0">
                 <a:solidFill>
                   <a:srgbClr val="FFFFFF"/>
                 </a:solidFill>
-                <a:latin typeface="Barlow Medium"/>
+                <a:latin typeface="+mj-lt"/>
               </a:rPr>
-              <a:t>Q2: Do structural elements like duration, tempo, and key show a significant correlation with popularity?</a:t>
-            </a:r>
-          </a:p>
-          <a:p>
-            <a:pPr marL="285750" indent="-285750" algn="just" defTabSz="593844">
-              <a:lnSpc>
-                <a:spcPts val="1909"/>
-              </a:lnSpc>
-              <a:spcBef>
-                <a:spcPct val="0"/>
-              </a:spcBef>
-              <a:buFont typeface="Arial" panose="020B0604020202020204" pitchFamily="34" charset="0"/>
-              <a:buChar char="•"/>
-            </a:pPr>
-            <a:endParaRPr lang="en-US" sz="1500" dirty="0">
-              <a:solidFill>
-                <a:srgbClr val="FFFFFF"/>
-              </a:solidFill>
-              <a:latin typeface="Barlow Medium"/>
-            </a:endParaRPr>
-          </a:p>
-          <a:p>
-            <a:pPr marL="285750" indent="-285750" algn="just" defTabSz="593844">
-              <a:lnSpc>
-                <a:spcPts val="1909"/>
-              </a:lnSpc>
-              <a:spcBef>
-                <a:spcPct val="0"/>
-              </a:spcBef>
-              <a:buFont typeface="Arial" panose="020B0604020202020204" pitchFamily="34" charset="0"/>
-              <a:buChar char="•"/>
-            </a:pPr>
-            <a:r>
-              <a:rPr lang="en-US" sz="1500" dirty="0">
-                <a:solidFill>
-                  <a:srgbClr val="FFFFFF"/>
-                </a:solidFill>
-                <a:latin typeface="Barlow Medium"/>
-              </a:rPr>
-              <a:t>Q3: Can a machine learning model be developed to accurately predict whether a song will achieve high popularity?</a:t>
+              <a:t>Can a machine learning model be developed to accurately predict whether a song will achieve high popularity?</a:t>
             </a:r>
           </a:p>
         </p:txBody>
@@ -21035,8 +20551,8 @@
         </p:nvSpPr>
         <p:spPr>
           <a:xfrm>
-            <a:off x="15152509" y="791360"/>
-            <a:ext cx="6897074" cy="2029915"/>
+            <a:off x="7907019" y="17214426"/>
+            <a:ext cx="6897074" cy="1756635"/>
           </a:xfrm>
           <a:prstGeom prst="rect">
             <a:avLst/>
@@ -21048,78 +20564,93 @@
           </a:bodyPr>
           <a:lstStyle/>
           <a:p>
-            <a:pPr algn="just">
+            <a:pPr marL="285750" indent="-285750">
               <a:lnSpc>
                 <a:spcPct val="107000"/>
               </a:lnSpc>
               <a:spcAft>
                 <a:spcPts val="800"/>
               </a:spcAft>
+              <a:buFont typeface="Arial" panose="020B0604020202020204" pitchFamily="34" charset="0"/>
+              <a:buChar char="•"/>
             </a:pPr>
             <a:r>
-              <a:rPr lang="en-IE" sz="1550" spc="-1" dirty="0">
+              <a:rPr lang="en-IE" sz="2400" b="1" spc="-1" dirty="0">
                 <a:solidFill>
                   <a:prstClr val="black"/>
                 </a:solidFill>
                 <a:latin typeface="Arial Nova Light"/>
               </a:rPr>
-              <a:t>The gender wage gap is a significant challenge across Europe. This project aims to explore and </a:t>
-            </a:r>
-            <a:r>
-              <a:rPr lang="en-IE" sz="1550" spc="-1" dirty="0" err="1">
-                <a:solidFill>
-                  <a:prstClr val="black"/>
-                </a:solidFill>
-                <a:latin typeface="Arial Nova Light"/>
-              </a:rPr>
-              <a:t>analyze</a:t>
-            </a:r>
-            <a:r>
-              <a:rPr lang="en-IE" sz="1550" spc="-1" dirty="0">
-                <a:solidFill>
-                  <a:prstClr val="black"/>
-                </a:solidFill>
-                <a:latin typeface="Arial Nova Light"/>
-              </a:rPr>
-              <a:t> gender-based differences in employment and provide recommendations for improving wage equality.</a:t>
-            </a:r>
-          </a:p>
-          <a:p>
-            <a:pPr algn="just">
+              <a:t>Digital marketplace​​</a:t>
+            </a:r>
+          </a:p>
+          <a:p>
+            <a:pPr marL="285750" indent="-285750">
               <a:lnSpc>
                 <a:spcPct val="107000"/>
               </a:lnSpc>
               <a:spcAft>
                 <a:spcPts val="800"/>
               </a:spcAft>
+              <a:buFont typeface="Arial" panose="020B0604020202020204" pitchFamily="34" charset="0"/>
+              <a:buChar char="•"/>
             </a:pPr>
             <a:r>
-              <a:rPr lang="en-IE" sz="1550" spc="-1" dirty="0">
+              <a:rPr lang="en-IE" sz="2400" b="1" spc="-1" dirty="0">
                 <a:solidFill>
                   <a:prstClr val="black"/>
                 </a:solidFill>
                 <a:latin typeface="Arial Nova Light"/>
               </a:rPr>
-              <a:t>By understanding the disparities in wages, policymakers can create solutions to promote fair pay practices and improve equality.</a:t>
-            </a:r>
-          </a:p>
-          <a:p>
-            <a:pPr algn="just">
+              <a:t>Problem</a:t>
+            </a:r>
+            <a:r>
+              <a:rPr lang="en-IE" sz="2400" spc="-1" dirty="0">
+                <a:solidFill>
+                  <a:prstClr val="black"/>
+                </a:solidFill>
+                <a:latin typeface="Arial Nova Light"/>
+              </a:rPr>
+              <a:t>: Music discovery challenge in saturated </a:t>
+            </a:r>
+          </a:p>
+          <a:p>
+            <a:pPr marL="285750" indent="-285750">
               <a:lnSpc>
                 <a:spcPct val="107000"/>
               </a:lnSpc>
               <a:spcAft>
                 <a:spcPts val="800"/>
               </a:spcAft>
+              <a:buFont typeface="Arial" panose="020B0604020202020204" pitchFamily="34" charset="0"/>
+              <a:buChar char="•"/>
             </a:pPr>
             <a:r>
-              <a:rPr lang="en-IE" sz="1550" spc="-1" dirty="0">
+              <a:rPr lang="en-IE" sz="2400" b="1" spc="-1" dirty="0">
                 <a:solidFill>
                   <a:prstClr val="black"/>
                 </a:solidFill>
                 <a:latin typeface="Arial Nova Light"/>
               </a:rPr>
-              <a:t>Using machine learning helps identify the key factors that influence the wage gap, providing insights for future policy adjustments.</a:t>
+              <a:t>Goal</a:t>
+            </a:r>
+            <a:r>
+              <a:rPr lang="en-IE" sz="2400" spc="-1" dirty="0">
+                <a:solidFill>
+                  <a:prstClr val="black"/>
+                </a:solidFill>
+                <a:latin typeface="Arial Nova Light"/>
+              </a:rPr>
+              <a:t>: Identify data-driven characteristics of successful songs</a:t>
+            </a:r>
+            <a:r>
+              <a:rPr lang="en-IE" sz="1550" spc="-1" dirty="0">
+                <a:solidFill>
+                  <a:prstClr val="black"/>
+                </a:solidFill>
+                <a:latin typeface="Arial Nova Light"/>
+              </a:rPr>
+              <a:t>​​</a:t>
             </a:r>
           </a:p>
         </p:txBody>
@@ -21138,8 +20669,8 @@
         </p:nvSpPr>
         <p:spPr>
           <a:xfrm>
-            <a:off x="15204723" y="13188412"/>
-            <a:ext cx="6911977" cy="8253541"/>
+            <a:off x="15204723" y="11647461"/>
+            <a:ext cx="6911977" cy="9807813"/>
           </a:xfrm>
           <a:prstGeom prst="rect">
             <a:avLst/>
@@ -21157,7 +20688,7 @@
               </a:spcAft>
             </a:pPr>
             <a:r>
-              <a:rPr lang="en-IE" sz="1550" b="1" spc="-1" dirty="0">
+              <a:rPr lang="en-IE" sz="1800" b="1" spc="-1" dirty="0">
                 <a:solidFill>
                   <a:prstClr val="black"/>
                 </a:solidFill>
@@ -21175,7 +20706,7 @@
               <a:buChar char="•"/>
             </a:pPr>
             <a:r>
-              <a:rPr lang="en-IE" sz="1550" spc="-1" dirty="0">
+              <a:rPr lang="en-IE" sz="1800" spc="-1" dirty="0">
                 <a:solidFill>
                   <a:prstClr val="black"/>
                 </a:solidFill>
@@ -21193,7 +20724,7 @@
               <a:buChar char="•"/>
             </a:pPr>
             <a:r>
-              <a:rPr lang="en-IE" sz="1550" spc="-1" dirty="0">
+              <a:rPr lang="en-IE" sz="1800" spc="-1" dirty="0">
                 <a:solidFill>
                   <a:prstClr val="black"/>
                 </a:solidFill>
@@ -21209,7 +20740,7 @@
               </a:spcAft>
             </a:pPr>
             <a:r>
-              <a:rPr lang="en-IE" sz="1550" b="1" spc="-1" dirty="0">
+              <a:rPr lang="en-IE" sz="1800" b="1" spc="-1" dirty="0">
                 <a:solidFill>
                   <a:prstClr val="black"/>
                 </a:solidFill>
@@ -21227,16 +20758,25 @@
               <a:buChar char="•"/>
             </a:pPr>
             <a:r>
-              <a:rPr lang="en-IE" sz="1550" spc="-1" dirty="0">
+              <a:rPr lang="en-IE" sz="1800" b="1" spc="-1" dirty="0">
                 <a:solidFill>
                   <a:prstClr val="black"/>
                 </a:solidFill>
                 <a:latin typeface="Arial Nova Light"/>
               </a:rPr>
-              <a:t>Missing values: Removed all rows containing </a:t>
-            </a:r>
-            <a:r>
-              <a:rPr lang="en-IE" sz="1550" spc="-1" dirty="0" err="1">
+              <a:t>Missing values</a:t>
+            </a:r>
+            <a:r>
+              <a:rPr lang="en-IE" sz="1800" spc="-1" dirty="0">
+                <a:solidFill>
+                  <a:prstClr val="black"/>
+                </a:solidFill>
+                <a:latin typeface="Arial Nova Light"/>
+              </a:rPr>
+              <a:t>: Removed all rows containing </a:t>
+            </a:r>
+            <a:r>
+              <a:rPr lang="en-IE" sz="1800" spc="-1" dirty="0" err="1">
                 <a:solidFill>
                   <a:prstClr val="black"/>
                 </a:solidFill>
@@ -21245,7 +20785,7 @@
               <a:t>NaN</a:t>
             </a:r>
             <a:r>
-              <a:rPr lang="en-IE" sz="1550" spc="-1" dirty="0">
+              <a:rPr lang="en-IE" sz="1800" spc="-1" dirty="0">
                 <a:solidFill>
                   <a:prstClr val="black"/>
                 </a:solidFill>
@@ -21263,13 +20803,22 @@
               <a:buChar char="•"/>
             </a:pPr>
             <a:r>
-              <a:rPr lang="en-IE" sz="1550" spc="-1" dirty="0">
+              <a:rPr lang="en-IE" sz="1800" b="1" spc="-1" dirty="0">
                 <a:solidFill>
                   <a:prstClr val="black"/>
                 </a:solidFill>
                 <a:latin typeface="Arial Nova Light"/>
               </a:rPr>
-              <a:t>Duplicates: Identified and eliminated duplicate records​​</a:t>
+              <a:t>Duplicates</a:t>
+            </a:r>
+            <a:r>
+              <a:rPr lang="en-IE" sz="1800" spc="-1" dirty="0">
+                <a:solidFill>
+                  <a:prstClr val="black"/>
+                </a:solidFill>
+                <a:latin typeface="Arial Nova Light"/>
+              </a:rPr>
+              <a:t>: Identified and eliminated duplicate records​​</a:t>
             </a:r>
           </a:p>
           <a:p>
@@ -21281,16 +20830,25 @@
               <a:buChar char="•"/>
             </a:pPr>
             <a:r>
-              <a:rPr lang="en-IE" sz="1550" spc="-1" dirty="0">
+              <a:rPr lang="en-IE" sz="1800" b="1" spc="-1" dirty="0">
                 <a:solidFill>
                   <a:prstClr val="black"/>
                 </a:solidFill>
                 <a:latin typeface="Arial Nova Light"/>
               </a:rPr>
-              <a:t>Irrelevant features: Dropped non-predictive columns (</a:t>
-            </a:r>
-            <a:r>
-              <a:rPr lang="en-IE" sz="1550" spc="-1" dirty="0" err="1">
+              <a:t>Irrelevant features</a:t>
+            </a:r>
+            <a:r>
+              <a:rPr lang="en-IE" sz="1800" spc="-1" dirty="0">
+                <a:solidFill>
+                  <a:prstClr val="black"/>
+                </a:solidFill>
+                <a:latin typeface="Arial Nova Light"/>
+              </a:rPr>
+              <a:t>: Dropped non-predictive columns (</a:t>
+            </a:r>
+            <a:r>
+              <a:rPr lang="en-IE" sz="1800" spc="-1" dirty="0" err="1">
                 <a:solidFill>
                   <a:prstClr val="black"/>
                 </a:solidFill>
@@ -21299,7 +20857,7 @@
               <a:t>track_id</a:t>
             </a:r>
             <a:r>
-              <a:rPr lang="en-IE" sz="1550" spc="-1" dirty="0">
+              <a:rPr lang="en-IE" sz="1800" spc="-1" dirty="0">
                 <a:solidFill>
                   <a:prstClr val="black"/>
                 </a:solidFill>
@@ -21308,7 +20866,7 @@
               <a:t>, </a:t>
             </a:r>
             <a:r>
-              <a:rPr lang="en-IE" sz="1550" spc="-1" dirty="0" err="1">
+              <a:rPr lang="en-IE" sz="1800" spc="-1" dirty="0" err="1">
                 <a:solidFill>
                   <a:prstClr val="black"/>
                 </a:solidFill>
@@ -21317,7 +20875,7 @@
               <a:t>track_href</a:t>
             </a:r>
             <a:r>
-              <a:rPr lang="en-IE" sz="1550" spc="-1" dirty="0">
+              <a:rPr lang="en-IE" sz="1800" spc="-1" dirty="0">
                 <a:solidFill>
                   <a:prstClr val="black"/>
                 </a:solidFill>
@@ -21326,7 +20884,7 @@
               <a:t>, </a:t>
             </a:r>
             <a:r>
-              <a:rPr lang="en-IE" sz="1550" spc="-1" dirty="0" err="1">
+              <a:rPr lang="en-IE" sz="1800" spc="-1" dirty="0" err="1">
                 <a:solidFill>
                   <a:prstClr val="black"/>
                 </a:solidFill>
@@ -21335,7 +20893,7 @@
               <a:t>analysis_url</a:t>
             </a:r>
             <a:r>
-              <a:rPr lang="en-IE" sz="1550" spc="-1" dirty="0">
+              <a:rPr lang="en-IE" sz="1800" spc="-1" dirty="0">
                 <a:solidFill>
                   <a:prstClr val="black"/>
                 </a:solidFill>
@@ -21351,7 +20909,7 @@
               </a:spcAft>
             </a:pPr>
             <a:r>
-              <a:rPr lang="en-IE" sz="1550" b="1" spc="-1" dirty="0">
+              <a:rPr lang="en-IE" sz="1800" b="1" spc="-1" dirty="0">
                 <a:solidFill>
                   <a:prstClr val="black"/>
                 </a:solidFill>
@@ -21369,7 +20927,7 @@
               <a:buChar char="•"/>
             </a:pPr>
             <a:r>
-              <a:rPr lang="en-IE" sz="1550" spc="-1" dirty="0">
+              <a:rPr lang="en-IE" sz="1800" spc="-1" dirty="0">
                 <a:solidFill>
                   <a:prstClr val="black"/>
                 </a:solidFill>
@@ -21378,7 +20936,7 @@
               <a:t>Temporal extraction: Parsed </a:t>
             </a:r>
             <a:r>
-              <a:rPr lang="en-IE" sz="1550" spc="-1" dirty="0" err="1">
+              <a:rPr lang="en-IE" sz="1800" spc="-1" dirty="0" err="1">
                 <a:solidFill>
                   <a:prstClr val="black"/>
                 </a:solidFill>
@@ -21387,7 +20945,7 @@
               <a:t>track_album_release_date</a:t>
             </a:r>
             <a:r>
-              <a:rPr lang="en-IE" sz="1550" spc="-1" dirty="0">
+              <a:rPr lang="en-IE" sz="1800" spc="-1" dirty="0">
                 <a:solidFill>
                   <a:prstClr val="black"/>
                 </a:solidFill>
@@ -21405,7 +20963,7 @@
               <a:buChar char="•"/>
             </a:pPr>
             <a:r>
-              <a:rPr lang="en-IE" sz="1550" spc="-1" dirty="0">
+              <a:rPr lang="en-IE" sz="1800" spc="-1" dirty="0">
                 <a:solidFill>
                   <a:prstClr val="black"/>
                 </a:solidFill>
@@ -21421,7 +20979,7 @@
               </a:spcAft>
             </a:pPr>
             <a:r>
-              <a:rPr lang="en-IE" sz="1550" b="1" spc="-1" dirty="0">
+              <a:rPr lang="en-IE" sz="1800" b="1" spc="-1" dirty="0">
                 <a:solidFill>
                   <a:prstClr val="black"/>
                 </a:solidFill>
@@ -21439,7 +20997,7 @@
               <a:buChar char="•"/>
             </a:pPr>
             <a:r>
-              <a:rPr lang="en-IE" sz="1550" spc="-1" dirty="0" err="1">
+              <a:rPr lang="en-IE" sz="1800" b="1" spc="-1" dirty="0" err="1">
                 <a:solidFill>
                   <a:prstClr val="black"/>
                 </a:solidFill>
@@ -21448,7 +21006,7 @@
               <a:t>MinMaxScaler</a:t>
             </a:r>
             <a:r>
-              <a:rPr lang="en-IE" sz="1550" spc="-1" dirty="0">
+              <a:rPr lang="en-IE" sz="1800" spc="-1" dirty="0">
                 <a:solidFill>
                   <a:prstClr val="black"/>
                 </a:solidFill>
@@ -21466,13 +21024,22 @@
               <a:buChar char="•"/>
             </a:pPr>
             <a:r>
-              <a:rPr lang="en-IE" sz="1550" spc="-1" dirty="0">
+              <a:rPr lang="en-IE" sz="1800" b="1" spc="-1" dirty="0">
                 <a:solidFill>
                   <a:prstClr val="black"/>
                 </a:solidFill>
                 <a:latin typeface="Arial Nova Light"/>
               </a:rPr>
-              <a:t>Rationale: Prevents magnitude-sensitive algorithms (e.g., SVM) from feature dominance​​</a:t>
+              <a:t>Rationale</a:t>
+            </a:r>
+            <a:r>
+              <a:rPr lang="en-IE" sz="1800" spc="-1" dirty="0">
+                <a:solidFill>
+                  <a:prstClr val="black"/>
+                </a:solidFill>
+                <a:latin typeface="Arial Nova Light"/>
+              </a:rPr>
+              <a:t>: Prevents magnitude-sensitive algorithms (e.g., SVM) from feature dominance​​</a:t>
             </a:r>
           </a:p>
           <a:p>
@@ -21482,7 +21049,7 @@
               </a:spcAft>
             </a:pPr>
             <a:r>
-              <a:rPr lang="en-IE" sz="1550" b="1" spc="-1" dirty="0">
+              <a:rPr lang="en-IE" sz="1800" b="1" spc="-1" dirty="0">
                 <a:solidFill>
                   <a:prstClr val="black"/>
                 </a:solidFill>
@@ -21500,13 +21067,49 @@
               <a:buChar char="•"/>
             </a:pPr>
             <a:r>
-              <a:rPr lang="en-IE" sz="1550" spc="-1" dirty="0">
+              <a:rPr lang="en-IE" sz="1800" b="1" spc="-1" dirty="0">
                 <a:solidFill>
                   <a:prstClr val="black"/>
                 </a:solidFill>
                 <a:latin typeface="Arial Nova Light"/>
               </a:rPr>
-              <a:t>IQR method: Applied to each numeric feature individually​​</a:t>
+              <a:t>IQR method</a:t>
+            </a:r>
+            <a:r>
+              <a:rPr lang="en-IE" sz="1800" spc="-1" dirty="0">
+                <a:solidFill>
+                  <a:prstClr val="black"/>
+                </a:solidFill>
+                <a:latin typeface="Arial Nova Light"/>
+              </a:rPr>
+              <a:t>: Applied to each numeric feature individually</a:t>
+            </a:r>
+            <a:r>
+              <a:rPr lang="en-US" sz="1800" spc="-1" dirty="0">
+                <a:solidFill>
+                  <a:prstClr val="black"/>
+                </a:solidFill>
+                <a:latin typeface="Arial Nova Light"/>
+              </a:rPr>
+              <a:t> </a:t>
+            </a:r>
+            <a:r>
+              <a:rPr lang="en-US" sz="1800" b="1" i="1" spc="-1" dirty="0">
+                <a:solidFill>
+                  <a:prstClr val="black"/>
+                </a:solidFill>
+                <a:latin typeface="Arial Nova Light"/>
+              </a:rPr>
+              <a:t>Kateri, A. and Kateri, M. (2024). </a:t>
+            </a:r>
+            <a:r>
+              <a:rPr lang="en-IE" sz="1800" b="1" i="1" spc="-1" dirty="0">
+                <a:solidFill>
+                  <a:prstClr val="black"/>
+                </a:solidFill>
+                <a:latin typeface="Arial Nova Light"/>
+              </a:rPr>
+              <a:t>​​</a:t>
             </a:r>
           </a:p>
           <a:p>
@@ -21516,7 +21119,7 @@
               </a:spcAft>
             </a:pPr>
             <a:r>
-              <a:rPr lang="en-IE" sz="1550" b="1" spc="-1" dirty="0">
+              <a:rPr lang="en-IE" sz="1800" b="1" spc="-1" dirty="0">
                 <a:solidFill>
                   <a:prstClr val="black"/>
                 </a:solidFill>
@@ -21534,13 +21137,53 @@
               <a:buChar char="•"/>
             </a:pPr>
             <a:r>
-              <a:rPr lang="en-IE" sz="1550" spc="-1" dirty="0">
+              <a:rPr lang="en-IE" sz="1800" spc="-1" dirty="0">
                 <a:solidFill>
                   <a:prstClr val="black"/>
                 </a:solidFill>
                 <a:latin typeface="Arial Nova Light"/>
               </a:rPr>
-              <a:t>Verified target variable distribution to assess imbalance​​</a:t>
+              <a:t>Verified target variable distribution to assess imbalance​​ </a:t>
+            </a:r>
+            <a:r>
+              <a:rPr lang="en-US" sz="1800" b="1" i="1" spc="-1" dirty="0">
+                <a:solidFill>
+                  <a:prstClr val="black"/>
+                </a:solidFill>
+                <a:latin typeface="Arial Nova Light"/>
+              </a:rPr>
+              <a:t>Kateri, A. and Kateri, M. (2024). </a:t>
+            </a:r>
+            <a:r>
+              <a:rPr lang="en-IE" sz="1800" b="1" i="1" spc="-1" dirty="0">
+                <a:solidFill>
+                  <a:prstClr val="black"/>
+                </a:solidFill>
+                <a:latin typeface="Arial Nova Light"/>
+              </a:rPr>
+              <a:t>​​</a:t>
+            </a:r>
+            <a:endParaRPr lang="en-IE" sz="1800" spc="-1" dirty="0">
+              <a:solidFill>
+                <a:prstClr val="black"/>
+              </a:solidFill>
+              <a:latin typeface="Arial Nova Light"/>
+            </a:endParaRPr>
+          </a:p>
+          <a:p>
+            <a:pPr algn="just">
+              <a:spcAft>
+                <a:spcPts val="800"/>
+              </a:spcAft>
+            </a:pPr>
+            <a:r>
+              <a:rPr lang="en-IE" sz="1800" b="1" spc="-1" dirty="0">
+                <a:solidFill>
+                  <a:prstClr val="black"/>
+                </a:solidFill>
+                <a:latin typeface="Arial Nova Light"/>
+              </a:rPr>
+              <a:t>7. Final Dataset</a:t>
             </a:r>
           </a:p>
           <a:p>
@@ -21552,13 +21195,13 @@
               <a:buChar char="•"/>
             </a:pPr>
             <a:r>
-              <a:rPr lang="en-IE" sz="1550" spc="-1" dirty="0">
+              <a:rPr lang="en-IE" sz="1800" spc="-1" dirty="0">
                 <a:solidFill>
                   <a:prstClr val="black"/>
                 </a:solidFill>
                 <a:latin typeface="Arial Nova Light"/>
               </a:rPr>
-              <a:t>Final Dataset:</a:t>
+              <a:t>Records: 4,829 songs​</a:t>
             </a:r>
           </a:p>
           <a:p>
@@ -21570,13 +21213,13 @@
               <a:buChar char="•"/>
             </a:pPr>
             <a:r>
-              <a:rPr lang="en-IE" sz="1550" spc="-1" dirty="0">
+              <a:rPr lang="en-IE" sz="1800" spc="-1" dirty="0">
                 <a:solidFill>
                   <a:prstClr val="black"/>
                 </a:solidFill>
                 <a:latin typeface="Arial Nova Light"/>
               </a:rPr>
-              <a:t>Records: 4,829 songs​</a:t>
+              <a:t>Features: 20 predictive variables (after cleaning)​</a:t>
             </a:r>
           </a:p>
           <a:p>
@@ -21588,25 +21231,7 @@
               <a:buChar char="•"/>
             </a:pPr>
             <a:r>
-              <a:rPr lang="en-IE" sz="1550" spc="-1" dirty="0">
-                <a:solidFill>
-                  <a:prstClr val="black"/>
-                </a:solidFill>
-                <a:latin typeface="Arial Nova Light"/>
-              </a:rPr>
-              <a:t>Features: 20 predictive variables (after cleaning)​</a:t>
-            </a:r>
-          </a:p>
-          <a:p>
-            <a:pPr marL="285750" indent="-285750" algn="just">
-              <a:spcAft>
-                <a:spcPts val="800"/>
-              </a:spcAft>
-              <a:buFont typeface="Arial" panose="020B0604020202020204" pitchFamily="34" charset="0"/>
-              <a:buChar char="•"/>
-            </a:pPr>
-            <a:r>
-              <a:rPr lang="en-IE" sz="1550" spc="-1" dirty="0">
+              <a:rPr lang="en-IE" sz="1800" spc="-1" dirty="0">
                 <a:solidFill>
                   <a:prstClr val="black"/>
                 </a:solidFill>
@@ -21617,277 +21242,53 @@
           </a:p>
         </p:txBody>
       </p:sp>
-      <p:grpSp>
-        <p:nvGrpSpPr>
-          <p:cNvPr id="1189" name="Group 1188">
+      <p:sp>
+        <p:nvSpPr>
+          <p:cNvPr id="1191" name="TextBox 26">
             <a:extLst>
               <a:ext uri="{FF2B5EF4-FFF2-40B4-BE49-F238E27FC236}">
-                <a16:creationId xmlns:a16="http://schemas.microsoft.com/office/drawing/2014/main" id="{6ABD0937-11C0-345A-D339-699C8158EF76}"/>
+                <a16:creationId xmlns:a16="http://schemas.microsoft.com/office/drawing/2014/main" id="{FA29581A-4309-AFE7-600D-ECCB93F9A837}"/>
               </a:ext>
             </a:extLst>
           </p:cNvPr>
-          <p:cNvGrpSpPr/>
+          <p:cNvSpPr txBox="1"/>
           <p:nvPr/>
-        </p:nvGrpSpPr>
-        <p:grpSpPr>
+        </p:nvSpPr>
+        <p:spPr>
           <a:xfrm>
-            <a:off x="15231741" y="12075915"/>
-            <a:ext cx="6432093" cy="1080000"/>
-            <a:chOff x="15602820" y="5635291"/>
-            <a:chExt cx="6432093" cy="1080000"/>
+            <a:off x="15166996" y="11156019"/>
+            <a:ext cx="5097335" cy="469268"/>
           </a:xfrm>
-        </p:grpSpPr>
-        <p:grpSp>
-          <p:nvGrpSpPr>
-            <p:cNvPr id="1190" name="Group 1189">
-              <a:extLst>
-                <a:ext uri="{FF2B5EF4-FFF2-40B4-BE49-F238E27FC236}">
-                  <a16:creationId xmlns:a16="http://schemas.microsoft.com/office/drawing/2014/main" id="{06304A54-DA2C-B571-585B-8737FEDF5DF9}"/>
-                </a:ext>
-              </a:extLst>
-            </p:cNvPr>
-            <p:cNvGrpSpPr/>
-            <p:nvPr/>
-          </p:nvGrpSpPr>
-          <p:grpSpPr>
-            <a:xfrm>
-              <a:off x="15602820" y="5635291"/>
-              <a:ext cx="1080000" cy="1080000"/>
-              <a:chOff x="15602820" y="5635291"/>
-              <a:chExt cx="1080000" cy="1080000"/>
-            </a:xfrm>
-          </p:grpSpPr>
-          <p:sp>
-            <p:nvSpPr>
-              <p:cNvPr id="1192" name="Freeform 24">
-                <a:extLst>
-                  <a:ext uri="{FF2B5EF4-FFF2-40B4-BE49-F238E27FC236}">
-                    <a16:creationId xmlns:a16="http://schemas.microsoft.com/office/drawing/2014/main" id="{96F3BEF3-D3D6-CE9F-5C38-C5FE5252D67C}"/>
-                  </a:ext>
-                </a:extLst>
-              </p:cNvPr>
-              <p:cNvSpPr>
-                <a:spLocks noChangeAspect="1"/>
-              </p:cNvSpPr>
-              <p:nvPr/>
-            </p:nvSpPr>
-            <p:spPr>
-              <a:xfrm>
-                <a:off x="15602820" y="5635291"/>
-                <a:ext cx="1080000" cy="1080000"/>
-              </a:xfrm>
-              <a:custGeom>
-                <a:avLst/>
-                <a:gdLst/>
-                <a:ahLst/>
-                <a:cxnLst/>
-                <a:rect l="l" t="t" r="r" b="b"/>
-                <a:pathLst>
-                  <a:path w="6355080" h="6355080">
-                    <a:moveTo>
-                      <a:pt x="3177540" y="6355080"/>
-                    </a:moveTo>
-                    <a:cubicBezTo>
-                      <a:pt x="2329180" y="6355080"/>
-                      <a:pt x="1530350" y="6024880"/>
-                      <a:pt x="930910" y="5424170"/>
-                    </a:cubicBezTo>
-                    <a:cubicBezTo>
-                      <a:pt x="330200" y="4824730"/>
-                      <a:pt x="0" y="4025900"/>
-                      <a:pt x="0" y="3177540"/>
-                    </a:cubicBezTo>
-                    <a:cubicBezTo>
-                      <a:pt x="0" y="2329180"/>
-                      <a:pt x="330200" y="1530350"/>
-                      <a:pt x="930910" y="930910"/>
-                    </a:cubicBezTo>
-                    <a:cubicBezTo>
-                      <a:pt x="1530350" y="330200"/>
-                      <a:pt x="2329180" y="0"/>
-                      <a:pt x="3177540" y="0"/>
-                    </a:cubicBezTo>
-                    <a:cubicBezTo>
-                      <a:pt x="4025900" y="0"/>
-                      <a:pt x="4824730" y="330200"/>
-                      <a:pt x="5424170" y="930910"/>
-                    </a:cubicBezTo>
-                    <a:cubicBezTo>
-                      <a:pt x="6024880" y="1531620"/>
-                      <a:pt x="6355080" y="2329180"/>
-                      <a:pt x="6355080" y="3177540"/>
-                    </a:cubicBezTo>
-                    <a:cubicBezTo>
-                      <a:pt x="6355080" y="4025900"/>
-                      <a:pt x="6024880" y="4824730"/>
-                      <a:pt x="5424170" y="5424170"/>
-                    </a:cubicBezTo>
-                    <a:cubicBezTo>
-                      <a:pt x="4824730" y="6024880"/>
-                      <a:pt x="4025900" y="6355080"/>
-                      <a:pt x="3177540" y="6355080"/>
-                    </a:cubicBezTo>
-                    <a:close/>
-                    <a:moveTo>
-                      <a:pt x="3177540" y="190500"/>
-                    </a:moveTo>
-                    <a:cubicBezTo>
-                      <a:pt x="2379980" y="190500"/>
-                      <a:pt x="1629410" y="501650"/>
-                      <a:pt x="1065530" y="1065530"/>
-                    </a:cubicBezTo>
-                    <a:cubicBezTo>
-                      <a:pt x="501650" y="1629410"/>
-                      <a:pt x="190500" y="2379980"/>
-                      <a:pt x="190500" y="3177540"/>
-                    </a:cubicBezTo>
-                    <a:cubicBezTo>
-                      <a:pt x="190500" y="3975100"/>
-                      <a:pt x="501650" y="4725670"/>
-                      <a:pt x="1065530" y="5289550"/>
-                    </a:cubicBezTo>
-                    <a:cubicBezTo>
-                      <a:pt x="1629410" y="5853430"/>
-                      <a:pt x="2379980" y="6164580"/>
-                      <a:pt x="3177540" y="6164580"/>
-                    </a:cubicBezTo>
-                    <a:cubicBezTo>
-                      <a:pt x="3975100" y="6164580"/>
-                      <a:pt x="4725670" y="5853430"/>
-                      <a:pt x="5289550" y="5289550"/>
-                    </a:cubicBezTo>
-                    <a:cubicBezTo>
-                      <a:pt x="5853430" y="4725670"/>
-                      <a:pt x="6164580" y="3975100"/>
-                      <a:pt x="6164580" y="3177540"/>
-                    </a:cubicBezTo>
-                    <a:cubicBezTo>
-                      <a:pt x="6164580" y="2379980"/>
-                      <a:pt x="5853430" y="1629410"/>
-                      <a:pt x="5289550" y="1065530"/>
-                    </a:cubicBezTo>
-                    <a:cubicBezTo>
-                      <a:pt x="4725670" y="501650"/>
-                      <a:pt x="3975100" y="190500"/>
-                      <a:pt x="3177540" y="190500"/>
-                    </a:cubicBezTo>
-                    <a:close/>
-                  </a:path>
-                </a:pathLst>
-              </a:custGeom>
-              <a:solidFill>
-                <a:srgbClr val="04B0A0"/>
-              </a:solidFill>
-              <a:ln w="12700">
+          <a:prstGeom prst="rect">
+            <a:avLst/>
+          </a:prstGeom>
+        </p:spPr>
+        <p:txBody>
+          <a:bodyPr wrap="square" lIns="0" tIns="0" rIns="0" bIns="0" rtlCol="0" anchor="t">
+            <a:spAutoFit/>
+          </a:bodyPr>
+          <a:lstStyle/>
+          <a:p>
+            <a:pPr defTabSz="593844">
+              <a:lnSpc>
+                <a:spcPts val="4222"/>
+              </a:lnSpc>
+              <a:spcBef>
+                <a:spcPct val="0"/>
+              </a:spcBef>
+            </a:pPr>
+            <a:r>
+              <a:rPr lang="en-US" sz="4400" b="1" spc="100" dirty="0">
                 <a:solidFill>
                   <a:srgbClr val="04B0A0"/>
                 </a:solidFill>
-              </a:ln>
-            </p:spPr>
-            <p:txBody>
-              <a:bodyPr/>
-              <a:lstStyle/>
-              <a:p>
-                <a:endParaRPr lang="en-IE" dirty="0"/>
-              </a:p>
-            </p:txBody>
-          </p:sp>
-          <p:sp>
-            <p:nvSpPr>
-              <p:cNvPr id="1193" name="TextBox 25">
-                <a:extLst>
-                  <a:ext uri="{FF2B5EF4-FFF2-40B4-BE49-F238E27FC236}">
-                    <a16:creationId xmlns:a16="http://schemas.microsoft.com/office/drawing/2014/main" id="{249EFE88-D4C9-D8A1-65C2-653DB451805C}"/>
-                  </a:ext>
-                </a:extLst>
-              </p:cNvPr>
-              <p:cNvSpPr txBox="1"/>
-              <p:nvPr/>
-            </p:nvSpPr>
-            <p:spPr>
-              <a:xfrm>
-                <a:off x="15852060" y="5950029"/>
-                <a:ext cx="614708" cy="552908"/>
-              </a:xfrm>
-              <a:prstGeom prst="rect">
-                <a:avLst/>
-              </a:prstGeom>
-            </p:spPr>
-            <p:txBody>
-              <a:bodyPr lIns="0" tIns="0" rIns="0" bIns="0" rtlCol="0" anchor="t">
-                <a:spAutoFit/>
-              </a:bodyPr>
-              <a:lstStyle/>
-              <a:p>
-                <a:pPr algn="ctr" defTabSz="593844">
-                  <a:lnSpc>
-                    <a:spcPts val="4222"/>
-                  </a:lnSpc>
-                  <a:spcBef>
-                    <a:spcPct val="0"/>
-                  </a:spcBef>
-                </a:pPr>
-                <a:r>
-                  <a:rPr lang="en-US" sz="4400" b="1" spc="-97" dirty="0">
-                    <a:solidFill>
-                      <a:srgbClr val="04B0A0"/>
-                    </a:solidFill>
-                    <a:latin typeface="Space Mono" panose="020B0604020202020204" charset="0"/>
-                  </a:rPr>
-                  <a:t>04</a:t>
-                </a:r>
-              </a:p>
-            </p:txBody>
-          </p:sp>
-        </p:grpSp>
-        <p:sp>
-          <p:nvSpPr>
-            <p:cNvPr id="1191" name="TextBox 26">
-              <a:extLst>
-                <a:ext uri="{FF2B5EF4-FFF2-40B4-BE49-F238E27FC236}">
-                  <a16:creationId xmlns:a16="http://schemas.microsoft.com/office/drawing/2014/main" id="{FA29581A-4309-AFE7-600D-ECCB93F9A837}"/>
-                </a:ext>
-              </a:extLst>
-            </p:cNvPr>
-            <p:cNvSpPr txBox="1"/>
-            <p:nvPr/>
-          </p:nvSpPr>
-          <p:spPr>
-            <a:xfrm>
-              <a:off x="16833483" y="5950029"/>
-              <a:ext cx="5201430" cy="552908"/>
-            </a:xfrm>
-            <a:prstGeom prst="rect">
-              <a:avLst/>
-            </a:prstGeom>
-          </p:spPr>
-          <p:txBody>
-            <a:bodyPr wrap="square" lIns="0" tIns="0" rIns="0" bIns="0" rtlCol="0" anchor="t">
-              <a:spAutoFit/>
-            </a:bodyPr>
-            <a:lstStyle/>
-            <a:p>
-              <a:pPr defTabSz="593844">
-                <a:lnSpc>
-                  <a:spcPts val="4222"/>
-                </a:lnSpc>
-                <a:spcBef>
-                  <a:spcPct val="0"/>
-                </a:spcBef>
-              </a:pPr>
-              <a:r>
-                <a:rPr lang="en-US" sz="4400" b="1" spc="100" dirty="0">
-                  <a:solidFill>
-                    <a:srgbClr val="04B0A0"/>
-                  </a:solidFill>
-                  <a:latin typeface="Space Mono" panose="020B0604020202020204" charset="0"/>
-                </a:rPr>
-                <a:t>DATA PREPARATION</a:t>
-              </a:r>
-            </a:p>
-          </p:txBody>
-        </p:sp>
-      </p:grpSp>
+                <a:latin typeface="Space Mono" panose="020B0604020202020204" charset="0"/>
+              </a:rPr>
+              <a:t>DATA PREPARATION</a:t>
+            </a:r>
+          </a:p>
+        </p:txBody>
+      </p:sp>
       <p:sp>
         <p:nvSpPr>
           <p:cNvPr id="1221" name="TextBox 1220">
@@ -21902,8 +21303,8 @@
         </p:nvSpPr>
         <p:spPr>
           <a:xfrm>
-            <a:off x="161375" y="16056303"/>
-            <a:ext cx="7147356" cy="1477328"/>
+            <a:off x="37805" y="16997019"/>
+            <a:ext cx="7147356" cy="1708160"/>
           </a:xfrm>
           <a:prstGeom prst="rect">
             <a:avLst/>
@@ -21928,7 +21329,10 @@
             </a:r>
           </a:p>
           <a:p>
-            <a:pPr algn="just"/>
+            <a:pPr marL="285750" indent="-285750" algn="just">
+              <a:buFont typeface="Arial" panose="020B0604020202020204" pitchFamily="34" charset="0"/>
+              <a:buChar char="•"/>
+            </a:pPr>
             <a:r>
               <a:rPr lang="en-US" sz="1500" b="1" dirty="0">
                 <a:solidFill>
@@ -21936,7 +21340,22 @@
                 </a:solidFill>
                 <a:latin typeface="Arial Nova Light" panose="020B0304020202020204" pitchFamily="34" charset="0"/>
               </a:rPr>
-              <a:t>This chart is very clear: Average popularity was high during the years from 1960-1980, fell rapidly after 1990; it has slowly declined with some irregularities since then. This is a good example of how </a:t>
+              <a:t>This chart is very clear: Average popularity was high during the years from 1960-1980, fell rapidly after 1990</a:t>
+            </a:r>
+          </a:p>
+          <a:p>
+            <a:pPr marL="285750" indent="-285750" algn="just">
+              <a:buFont typeface="Arial" panose="020B0604020202020204" pitchFamily="34" charset="0"/>
+              <a:buChar char="•"/>
+            </a:pPr>
+            <a:r>
+              <a:rPr lang="en-US" sz="1500" b="1" dirty="0">
+                <a:solidFill>
+                  <a:schemeClr val="bg1"/>
+                </a:solidFill>
+                <a:latin typeface="Arial Nova Light" panose="020B0304020202020204" pitchFamily="34" charset="0"/>
+              </a:rPr>
+              <a:t>It has slowly declined with some irregularities since then. This is a good example of how </a:t>
             </a:r>
             <a:r>
               <a:rPr lang="en-US" sz="1500" b="1" dirty="0" err="1">
@@ -21973,8 +21392,8 @@
         </p:nvSpPr>
         <p:spPr>
           <a:xfrm>
-            <a:off x="22924226" y="2043161"/>
-            <a:ext cx="6397534" cy="5262979"/>
+            <a:off x="23015666" y="804832"/>
+            <a:ext cx="6397534" cy="5509200"/>
           </a:xfrm>
           <a:prstGeom prst="rect">
             <a:avLst/>
@@ -22068,11 +21487,11 @@
               <a:t> </a:t>
             </a:r>
             <a:r>
-              <a:rPr lang="pt-BR" sz="1600" dirty="0" err="1"/>
+              <a:rPr lang="pt-BR" sz="1600" b="1" dirty="0" err="1"/>
               <a:t>GridSearchCV</a:t>
             </a:r>
             <a:r>
-              <a:rPr lang="pt-BR" sz="1600" dirty="0"/>
+              <a:rPr lang="pt-BR" sz="1600" b="1" dirty="0"/>
               <a:t> (3-fold) </a:t>
             </a:r>
             <a:r>
@@ -22097,7 +21516,15 @@
             </a:r>
             <a:r>
               <a:rPr lang="pt-BR" sz="1600" dirty="0"/>
-              <a:t>.</a:t>
+              <a:t>. </a:t>
+            </a:r>
+            <a:r>
+              <a:rPr lang="pt-BR" sz="1600" b="1" i="1" dirty="0" err="1"/>
+              <a:t>FrancescaLazzeri</a:t>
+            </a:r>
+            <a:r>
+              <a:rPr lang="pt-BR" sz="1600" b="1" i="1" dirty="0"/>
+              <a:t> (2022).</a:t>
             </a:r>
           </a:p>
           <a:p>
@@ -22591,15 +22018,15 @@
           <p:nvPr/>
         </p:nvPicPr>
         <p:blipFill>
-          <a:blip r:embed="rId9"/>
+          <a:blip r:embed="rId6"/>
           <a:stretch>
             <a:fillRect/>
           </a:stretch>
         </p:blipFill>
         <p:spPr>
           <a:xfrm>
-            <a:off x="22959860" y="7373927"/>
-            <a:ext cx="4476126" cy="2226703"/>
+            <a:off x="23080085" y="6029130"/>
+            <a:ext cx="5348509" cy="2660680"/>
           </a:xfrm>
           <a:prstGeom prst="rect">
             <a:avLst/>
@@ -22621,15 +22048,15 @@
           <p:nvPr/>
         </p:nvPicPr>
         <p:blipFill>
-          <a:blip r:embed="rId10"/>
+          <a:blip r:embed="rId7"/>
           <a:stretch>
             <a:fillRect/>
           </a:stretch>
         </p:blipFill>
         <p:spPr>
           <a:xfrm>
-            <a:off x="22959860" y="9729309"/>
-            <a:ext cx="4485281" cy="2226703"/>
+            <a:off x="23080086" y="8552787"/>
+            <a:ext cx="5359448" cy="2660681"/>
           </a:xfrm>
           <a:prstGeom prst="rect">
             <a:avLst/>
@@ -22651,14 +22078,14 @@
           <p:nvPr/>
         </p:nvPicPr>
         <p:blipFill>
-          <a:blip r:embed="rId11"/>
+          <a:blip r:embed="rId8"/>
           <a:stretch>
             <a:fillRect/>
           </a:stretch>
         </p:blipFill>
         <p:spPr>
           <a:xfrm>
-            <a:off x="266437" y="12132494"/>
+            <a:off x="142867" y="13056276"/>
             <a:ext cx="6863635" cy="3752267"/>
           </a:xfrm>
           <a:prstGeom prst="rect">
@@ -22771,7 +22198,7 @@
           <p:nvPr/>
         </p:nvPicPr>
         <p:blipFill>
-          <a:blip r:embed="rId12" cstate="print">
+          <a:blip r:embed="rId9" cstate="print">
             <a:extLst>
               <a:ext uri="{28A0092B-C50C-407E-A947-70E740481C1C}">
                 <a14:useLocalDpi xmlns:a14="http://schemas.microsoft.com/office/drawing/2010/main" val="0"/>
@@ -22785,8 +22212,8 @@
         </p:blipFill>
         <p:spPr bwMode="auto">
           <a:xfrm>
-            <a:off x="27113809" y="-186567"/>
-            <a:ext cx="1715515" cy="1882165"/>
+            <a:off x="12346577" y="1265475"/>
+            <a:ext cx="1025731" cy="1125373"/>
           </a:xfrm>
           <a:prstGeom prst="rect">
             <a:avLst/>
@@ -22854,7 +22281,7 @@
         </p:nvSpPr>
         <p:spPr>
           <a:xfrm>
-            <a:off x="22771341" y="18664365"/>
+            <a:off x="22771341" y="20196839"/>
             <a:ext cx="7498782" cy="45719"/>
           </a:xfrm>
           <a:prstGeom prst="rect">
@@ -22908,7 +22335,7 @@
         </p:nvSpPr>
         <p:spPr>
           <a:xfrm>
-            <a:off x="15003823" y="11971485"/>
+            <a:off x="15003823" y="11023214"/>
             <a:ext cx="7641644" cy="70338"/>
           </a:xfrm>
           <a:prstGeom prst="rect">
@@ -22961,9 +22388,9 @@
           <p:nvPr/>
         </p:nvSpPr>
         <p:spPr>
-          <a:xfrm>
-            <a:off x="7566742" y="8262351"/>
-            <a:ext cx="7346597" cy="45719"/>
+          <a:xfrm flipV="1">
+            <a:off x="7361580" y="9730475"/>
+            <a:ext cx="7551759" cy="45719"/>
           </a:xfrm>
           <a:prstGeom prst="rect">
             <a:avLst/>
@@ -23015,9 +22442,9 @@
           <p:nvPr/>
         </p:nvSpPr>
         <p:spPr>
-          <a:xfrm>
-            <a:off x="7566742" y="3791466"/>
-            <a:ext cx="7346597" cy="45719"/>
+          <a:xfrm flipV="1">
+            <a:off x="7352583" y="5378123"/>
+            <a:ext cx="7560756" cy="45719"/>
           </a:xfrm>
           <a:prstGeom prst="rect">
             <a:avLst/>
@@ -23071,7 +22498,7 @@
           <p:nvPr/>
         </p:nvPicPr>
         <p:blipFill>
-          <a:blip r:embed="rId13">
+          <a:blip r:embed="rId10">
             <a:alphaModFix amt="48000"/>
             <a:extLst>
               <a:ext uri="{28A0092B-C50C-407E-A947-70E740481C1C}">
@@ -23118,7 +22545,7 @@
         </p:nvSpPr>
         <p:spPr>
           <a:xfrm>
-            <a:off x="22741945" y="14078629"/>
+            <a:off x="22741945" y="14180233"/>
             <a:ext cx="7533268" cy="70338"/>
           </a:xfrm>
           <a:prstGeom prst="rect">
@@ -23158,6 +22585,247 @@
           </a:p>
         </p:txBody>
       </p:sp>
+      <p:pic>
+        <p:nvPicPr>
+          <p:cNvPr id="37" name="Picture 36">
+            <a:extLst>
+              <a:ext uri="{FF2B5EF4-FFF2-40B4-BE49-F238E27FC236}">
+                <a16:creationId xmlns:a16="http://schemas.microsoft.com/office/drawing/2014/main" id="{030A4E9F-BF9E-173F-B314-E8825D0F2799}"/>
+              </a:ext>
+            </a:extLst>
+          </p:cNvPr>
+          <p:cNvPicPr>
+            <a:picLocks noChangeAspect="1"/>
+          </p:cNvPicPr>
+          <p:nvPr/>
+        </p:nvPicPr>
+        <p:blipFill>
+          <a:blip r:embed="rId11"/>
+          <a:stretch>
+            <a:fillRect/>
+          </a:stretch>
+        </p:blipFill>
+        <p:spPr>
+          <a:xfrm>
+            <a:off x="4759453" y="4261455"/>
+            <a:ext cx="1933769" cy="717610"/>
+          </a:xfrm>
+          <a:prstGeom prst="rect">
+            <a:avLst/>
+          </a:prstGeom>
+        </p:spPr>
+      </p:pic>
+      <p:pic>
+        <p:nvPicPr>
+          <p:cNvPr id="38" name="Picture 12" descr="CRISP-DM Model (Taylor, 2017) | Download Scientific Diagram">
+            <a:extLst>
+              <a:ext uri="{FF2B5EF4-FFF2-40B4-BE49-F238E27FC236}">
+                <a16:creationId xmlns:a16="http://schemas.microsoft.com/office/drawing/2014/main" id="{232D8CDA-9A0E-2542-E82E-A87C3AE1FF79}"/>
+              </a:ext>
+            </a:extLst>
+          </p:cNvPr>
+          <p:cNvPicPr>
+            <a:picLocks noChangeAspect="1" noChangeArrowheads="1"/>
+          </p:cNvPicPr>
+          <p:nvPr/>
+        </p:nvPicPr>
+        <p:blipFill>
+          <a:blip r:embed="rId12">
+            <a:extLst>
+              <a:ext uri="{28A0092B-C50C-407E-A947-70E740481C1C}">
+                <a14:useLocalDpi xmlns:a14="http://schemas.microsoft.com/office/drawing/2010/main" val="0"/>
+              </a:ext>
+            </a:extLst>
+          </a:blip>
+          <a:srcRect/>
+          <a:stretch>
+            <a:fillRect/>
+          </a:stretch>
+        </p:blipFill>
+        <p:spPr bwMode="auto">
+          <a:xfrm>
+            <a:off x="8598096" y="11461688"/>
+            <a:ext cx="4863539" cy="4863539"/>
+          </a:xfrm>
+          <a:prstGeom prst="rect">
+            <a:avLst/>
+          </a:prstGeom>
+          <a:noFill/>
+          <a:extLst>
+            <a:ext uri="{909E8E84-426E-40DD-AFC4-6F175D3DCCD1}">
+              <a14:hiddenFill xmlns:a14="http://schemas.microsoft.com/office/drawing/2010/main">
+                <a:solidFill>
+                  <a:srgbClr val="FFFFFF"/>
+                </a:solidFill>
+              </a14:hiddenFill>
+            </a:ext>
+          </a:extLst>
+        </p:spPr>
+      </p:pic>
+      <p:sp>
+        <p:nvSpPr>
+          <p:cNvPr id="40" name="TextBox 39">
+            <a:extLst>
+              <a:ext uri="{FF2B5EF4-FFF2-40B4-BE49-F238E27FC236}">
+                <a16:creationId xmlns:a16="http://schemas.microsoft.com/office/drawing/2014/main" id="{F477ADBB-A642-8610-4A00-8293AB3A70C4}"/>
+              </a:ext>
+            </a:extLst>
+          </p:cNvPr>
+          <p:cNvSpPr txBox="1"/>
+          <p:nvPr/>
+        </p:nvSpPr>
+        <p:spPr>
+          <a:xfrm>
+            <a:off x="15136813" y="9132790"/>
+            <a:ext cx="7147356" cy="1708160"/>
+          </a:xfrm>
+          <a:prstGeom prst="rect">
+            <a:avLst/>
+          </a:prstGeom>
+          <a:noFill/>
+        </p:spPr>
+        <p:txBody>
+          <a:bodyPr wrap="square">
+            <a:spAutoFit/>
+          </a:bodyPr>
+          <a:lstStyle/>
+          <a:p>
+            <a:pPr algn="just"/>
+            <a:r>
+              <a:rPr lang="en-US" sz="1500" dirty="0">
+                <a:latin typeface="Arial Nova Light" panose="020B0304020202020204" pitchFamily="34" charset="0"/>
+              </a:rPr>
+              <a:t>The bar chart shows the average "</a:t>
+            </a:r>
+            <a:r>
+              <a:rPr lang="en-US" sz="1500" b="1" dirty="0">
+                <a:latin typeface="Arial Nova Light" panose="020B0304020202020204" pitchFamily="34" charset="0"/>
+              </a:rPr>
+              <a:t>fingerprint</a:t>
+            </a:r>
+            <a:r>
+              <a:rPr lang="en-US" sz="1500" dirty="0">
+                <a:latin typeface="Arial Nova Light" panose="020B0304020202020204" pitchFamily="34" charset="0"/>
+              </a:rPr>
+              <a:t>" of various music genres using scaled features like </a:t>
+            </a:r>
+            <a:r>
+              <a:rPr lang="en-US" sz="1500" b="1" dirty="0">
+                <a:latin typeface="Arial Nova Light" panose="020B0304020202020204" pitchFamily="34" charset="0"/>
+              </a:rPr>
+              <a:t>energy, danceability, valence (positivity), tempo, loudness, and </a:t>
+            </a:r>
+            <a:r>
+              <a:rPr lang="en-US" sz="1500" b="1" dirty="0" err="1">
+                <a:latin typeface="Arial Nova Light" panose="020B0304020202020204" pitchFamily="34" charset="0"/>
+              </a:rPr>
+              <a:t>acousticness</a:t>
+            </a:r>
+            <a:r>
+              <a:rPr lang="en-US" sz="1500" b="1" dirty="0">
+                <a:latin typeface="Arial Nova Light" panose="020B0304020202020204" pitchFamily="34" charset="0"/>
+              </a:rPr>
+              <a:t>. </a:t>
+            </a:r>
+          </a:p>
+          <a:p>
+            <a:pPr algn="just"/>
+            <a:r>
+              <a:rPr lang="en-US" sz="1500" dirty="0">
+                <a:latin typeface="Arial Nova Light" panose="020B0304020202020204" pitchFamily="34" charset="0"/>
+              </a:rPr>
+              <a:t>Each genre displays a unique audio profile:</a:t>
+            </a:r>
+          </a:p>
+          <a:p>
+            <a:pPr marL="285750" indent="-285750" algn="just">
+              <a:buFont typeface="Arial" panose="020B0604020202020204" pitchFamily="34" charset="0"/>
+              <a:buChar char="•"/>
+            </a:pPr>
+            <a:r>
+              <a:rPr lang="en-US" sz="1500" b="1" dirty="0">
+                <a:latin typeface="Arial Nova Light" panose="020B0304020202020204" pitchFamily="34" charset="0"/>
+              </a:rPr>
+              <a:t>J-Pop and K-Pop </a:t>
+            </a:r>
+            <a:r>
+              <a:rPr lang="en-US" sz="1500" dirty="0">
+                <a:latin typeface="Arial Nova Light" panose="020B0304020202020204" pitchFamily="34" charset="0"/>
+              </a:rPr>
+              <a:t>have high energy, danceability, and loudness.</a:t>
+            </a:r>
+          </a:p>
+          <a:p>
+            <a:pPr marL="285750" indent="-285750" algn="just">
+              <a:buFont typeface="Arial" panose="020B0604020202020204" pitchFamily="34" charset="0"/>
+              <a:buChar char="•"/>
+            </a:pPr>
+            <a:r>
+              <a:rPr lang="en-US" sz="1500" b="1" dirty="0">
+                <a:latin typeface="Arial Nova Light" panose="020B0304020202020204" pitchFamily="34" charset="0"/>
+              </a:rPr>
+              <a:t>Ambient and Folk </a:t>
+            </a:r>
+            <a:r>
+              <a:rPr lang="en-US" sz="1500" dirty="0">
+                <a:latin typeface="Arial Nova Light" panose="020B0304020202020204" pitchFamily="34" charset="0"/>
+              </a:rPr>
+              <a:t>show high </a:t>
+            </a:r>
+            <a:r>
+              <a:rPr lang="en-US" sz="1500" dirty="0" err="1">
+                <a:latin typeface="Arial Nova Light" panose="020B0304020202020204" pitchFamily="34" charset="0"/>
+              </a:rPr>
+              <a:t>acousticness</a:t>
+            </a:r>
+            <a:r>
+              <a:rPr lang="en-US" sz="1500" dirty="0">
+                <a:latin typeface="Arial Nova Light" panose="020B0304020202020204" pitchFamily="34" charset="0"/>
+              </a:rPr>
+              <a:t> and low energy.</a:t>
+            </a:r>
+          </a:p>
+          <a:p>
+            <a:pPr algn="just"/>
+            <a:r>
+              <a:rPr lang="en-US" sz="1500" dirty="0">
+                <a:latin typeface="Arial Nova Light" panose="020B0304020202020204" pitchFamily="34" charset="0"/>
+              </a:rPr>
+              <a:t>This visual confirms that different genres have distinct sonic characteristics. </a:t>
+            </a:r>
+          </a:p>
+        </p:txBody>
+      </p:sp>
+      <p:pic>
+        <p:nvPicPr>
+          <p:cNvPr id="12" name="Picture 11">
+            <a:extLst>
+              <a:ext uri="{FF2B5EF4-FFF2-40B4-BE49-F238E27FC236}">
+                <a16:creationId xmlns:a16="http://schemas.microsoft.com/office/drawing/2014/main" id="{748440B3-FEF2-F616-0DDA-1C5388854788}"/>
+              </a:ext>
+            </a:extLst>
+          </p:cNvPr>
+          <p:cNvPicPr>
+            <a:picLocks noChangeAspect="1"/>
+          </p:cNvPicPr>
+          <p:nvPr/>
+        </p:nvPicPr>
+        <p:blipFill>
+          <a:blip r:embed="rId13"/>
+          <a:stretch>
+            <a:fillRect/>
+          </a:stretch>
+        </p:blipFill>
+        <p:spPr>
+          <a:xfrm>
+            <a:off x="23080085" y="11218369"/>
+            <a:ext cx="5359448" cy="2660681"/>
+          </a:xfrm>
+          <a:prstGeom prst="rect">
+            <a:avLst/>
+          </a:prstGeom>
+        </p:spPr>
+      </p:pic>
     </p:spTree>
   </p:cSld>
   <p:clrMapOvr>

</xml_diff>